<commit_message>
rainbow table and analysis
</commit_message>
<xml_diff>
--- a/report/img/rainbowTable.pptx
+++ b/report/img/rainbowTable.pptx
@@ -2968,6 +2968,2711 @@
           <a:chExt cx="0" cy="0"/>
         </a:xfrm>
       </p:grpSpPr>
+      <p:sp>
+        <p:nvSpPr>
+          <p:cNvPr id="4" name="Rectangle: Rounded Corners 3">
+            <a:extLst>
+              <a:ext uri="{FF2B5EF4-FFF2-40B4-BE49-F238E27FC236}">
+                <a16:creationId xmlns:a16="http://schemas.microsoft.com/office/drawing/2014/main" id="{C171CEC7-8CBD-4E24-B0B0-7C0BC9B742A5}"/>
+              </a:ext>
+            </a:extLst>
+          </p:cNvPr>
+          <p:cNvSpPr/>
+          <p:nvPr/>
+        </p:nvSpPr>
+        <p:spPr>
+          <a:xfrm>
+            <a:off x="881743" y="1045029"/>
+            <a:ext cx="5061857" cy="2841171"/>
+          </a:xfrm>
+          <a:prstGeom prst="roundRect">
+            <a:avLst/>
+          </a:prstGeom>
+        </p:spPr>
+        <p:style>
+          <a:lnRef idx="2">
+            <a:schemeClr val="accent5">
+              <a:shade val="50000"/>
+            </a:schemeClr>
+          </a:lnRef>
+          <a:fillRef idx="1">
+            <a:schemeClr val="accent5"/>
+          </a:fillRef>
+          <a:effectRef idx="0">
+            <a:schemeClr val="accent5"/>
+          </a:effectRef>
+          <a:fontRef idx="minor">
+            <a:schemeClr val="lt1"/>
+          </a:fontRef>
+        </p:style>
+        <p:txBody>
+          <a:bodyPr rtlCol="0" anchor="ctr"/>
+          <a:lstStyle/>
+          <a:p>
+            <a:pPr algn="ctr"/>
+            <a:r>
+              <a:rPr lang="en-US" sz="6600" dirty="0"/>
+              <a:t>William</a:t>
+            </a:r>
+          </a:p>
+        </p:txBody>
+      </p:sp>
+      <p:sp>
+        <p:nvSpPr>
+          <p:cNvPr id="6" name="Rectangle: Rounded Corners 5">
+            <a:extLst>
+              <a:ext uri="{FF2B5EF4-FFF2-40B4-BE49-F238E27FC236}">
+                <a16:creationId xmlns:a16="http://schemas.microsoft.com/office/drawing/2014/main" id="{11F9ED64-0DAF-4299-AADD-09DBFF15E834}"/>
+              </a:ext>
+            </a:extLst>
+          </p:cNvPr>
+          <p:cNvSpPr/>
+          <p:nvPr/>
+        </p:nvSpPr>
+        <p:spPr>
+          <a:xfrm>
+            <a:off x="8120743" y="1045029"/>
+            <a:ext cx="5061857" cy="2841171"/>
+          </a:xfrm>
+          <a:prstGeom prst="roundRect">
+            <a:avLst/>
+          </a:prstGeom>
+        </p:spPr>
+        <p:style>
+          <a:lnRef idx="1">
+            <a:schemeClr val="accent5"/>
+          </a:lnRef>
+          <a:fillRef idx="2">
+            <a:schemeClr val="accent5"/>
+          </a:fillRef>
+          <a:effectRef idx="1">
+            <a:schemeClr val="accent5"/>
+          </a:effectRef>
+          <a:fontRef idx="minor">
+            <a:schemeClr val="dk1"/>
+          </a:fontRef>
+        </p:style>
+        <p:txBody>
+          <a:bodyPr rtlCol="0" anchor="ctr"/>
+          <a:lstStyle/>
+          <a:p>
+            <a:pPr algn="ctr"/>
+            <a:r>
+              <a:rPr lang="en-US" sz="6600" dirty="0"/>
+              <a:t>9ea847</a:t>
+            </a:r>
+          </a:p>
+        </p:txBody>
+      </p:sp>
+      <p:sp>
+        <p:nvSpPr>
+          <p:cNvPr id="7" name="Rectangle: Rounded Corners 6">
+            <a:extLst>
+              <a:ext uri="{FF2B5EF4-FFF2-40B4-BE49-F238E27FC236}">
+                <a16:creationId xmlns:a16="http://schemas.microsoft.com/office/drawing/2014/main" id="{5EB912FC-EDAC-46F4-86D0-58150ED8733B}"/>
+              </a:ext>
+            </a:extLst>
+          </p:cNvPr>
+          <p:cNvSpPr/>
+          <p:nvPr/>
+        </p:nvSpPr>
+        <p:spPr>
+          <a:xfrm>
+            <a:off x="22598743" y="1045028"/>
+            <a:ext cx="5061857" cy="2841171"/>
+          </a:xfrm>
+          <a:prstGeom prst="roundRect">
+            <a:avLst/>
+          </a:prstGeom>
+        </p:spPr>
+        <p:style>
+          <a:lnRef idx="1">
+            <a:schemeClr val="accent5"/>
+          </a:lnRef>
+          <a:fillRef idx="2">
+            <a:schemeClr val="accent5"/>
+          </a:fillRef>
+          <a:effectRef idx="1">
+            <a:schemeClr val="accent5"/>
+          </a:effectRef>
+          <a:fontRef idx="minor">
+            <a:schemeClr val="dk1"/>
+          </a:fontRef>
+        </p:style>
+        <p:txBody>
+          <a:bodyPr rtlCol="0" anchor="ctr"/>
+          <a:lstStyle/>
+          <a:p>
+            <a:pPr algn="ctr"/>
+            <a:r>
+              <a:rPr lang="en-US" sz="6600" dirty="0"/>
+              <a:t>ea0012</a:t>
+            </a:r>
+          </a:p>
+        </p:txBody>
+      </p:sp>
+      <p:sp>
+        <p:nvSpPr>
+          <p:cNvPr id="8" name="Rectangle: Rounded Corners 7">
+            <a:extLst>
+              <a:ext uri="{FF2B5EF4-FFF2-40B4-BE49-F238E27FC236}">
+                <a16:creationId xmlns:a16="http://schemas.microsoft.com/office/drawing/2014/main" id="{175DC48A-FB0F-4A81-ADE1-A5227814DE96}"/>
+              </a:ext>
+            </a:extLst>
+          </p:cNvPr>
+          <p:cNvSpPr/>
+          <p:nvPr/>
+        </p:nvSpPr>
+        <p:spPr>
+          <a:xfrm>
+            <a:off x="15359743" y="1045029"/>
+            <a:ext cx="5061857" cy="2841171"/>
+          </a:xfrm>
+          <a:prstGeom prst="roundRect">
+            <a:avLst/>
+          </a:prstGeom>
+        </p:spPr>
+        <p:style>
+          <a:lnRef idx="2">
+            <a:schemeClr val="accent5">
+              <a:shade val="50000"/>
+            </a:schemeClr>
+          </a:lnRef>
+          <a:fillRef idx="1">
+            <a:schemeClr val="accent5"/>
+          </a:fillRef>
+          <a:effectRef idx="0">
+            <a:schemeClr val="accent5"/>
+          </a:effectRef>
+          <a:fontRef idx="minor">
+            <a:schemeClr val="lt1"/>
+          </a:fontRef>
+        </p:style>
+        <p:txBody>
+          <a:bodyPr rtlCol="0" anchor="ctr"/>
+          <a:lstStyle/>
+          <a:p>
+            <a:pPr algn="ctr"/>
+            <a:r>
+              <a:rPr lang="en-US" sz="6600" dirty="0"/>
+              <a:t>is</a:t>
+            </a:r>
+          </a:p>
+        </p:txBody>
+      </p:sp>
+      <p:sp>
+        <p:nvSpPr>
+          <p:cNvPr id="9" name="Rectangle: Rounded Corners 8">
+            <a:extLst>
+              <a:ext uri="{FF2B5EF4-FFF2-40B4-BE49-F238E27FC236}">
+                <a16:creationId xmlns:a16="http://schemas.microsoft.com/office/drawing/2014/main" id="{9F401F10-EF00-4153-BA81-3DF6CDA3828F}"/>
+              </a:ext>
+            </a:extLst>
+          </p:cNvPr>
+          <p:cNvSpPr/>
+          <p:nvPr/>
+        </p:nvSpPr>
+        <p:spPr>
+          <a:xfrm>
+            <a:off x="29837743" y="1045027"/>
+            <a:ext cx="5061857" cy="2841171"/>
+          </a:xfrm>
+          <a:prstGeom prst="roundRect">
+            <a:avLst/>
+          </a:prstGeom>
+        </p:spPr>
+        <p:style>
+          <a:lnRef idx="2">
+            <a:schemeClr val="accent5">
+              <a:shade val="50000"/>
+            </a:schemeClr>
+          </a:lnRef>
+          <a:fillRef idx="1">
+            <a:schemeClr val="accent5"/>
+          </a:fillRef>
+          <a:effectRef idx="0">
+            <a:schemeClr val="accent5"/>
+          </a:effectRef>
+          <a:fontRef idx="minor">
+            <a:schemeClr val="lt1"/>
+          </a:fontRef>
+        </p:style>
+        <p:txBody>
+          <a:bodyPr rtlCol="0" anchor="ctr"/>
+          <a:lstStyle/>
+          <a:p>
+            <a:pPr algn="ctr"/>
+            <a:r>
+              <a:rPr lang="en-US" sz="6600" dirty="0"/>
+              <a:t>handsome</a:t>
+            </a:r>
+          </a:p>
+        </p:txBody>
+      </p:sp>
+      <p:grpSp>
+        <p:nvGrpSpPr>
+          <p:cNvPr id="17" name="Group 16">
+            <a:extLst>
+              <a:ext uri="{FF2B5EF4-FFF2-40B4-BE49-F238E27FC236}">
+                <a16:creationId xmlns:a16="http://schemas.microsoft.com/office/drawing/2014/main" id="{67D60429-AF21-4E96-9481-4D2AB1D9036F}"/>
+              </a:ext>
+            </a:extLst>
+          </p:cNvPr>
+          <p:cNvGrpSpPr/>
+          <p:nvPr/>
+        </p:nvGrpSpPr>
+        <p:grpSpPr>
+          <a:xfrm>
+            <a:off x="5943600" y="1293656"/>
+            <a:ext cx="2177143" cy="1171959"/>
+            <a:chOff x="5943600" y="1293656"/>
+            <a:chExt cx="2177143" cy="1171959"/>
+          </a:xfrm>
+        </p:grpSpPr>
+        <p:cxnSp>
+          <p:nvCxnSpPr>
+            <p:cNvPr id="11" name="Straight Arrow Connector 10">
+              <a:extLst>
+                <a:ext uri="{FF2B5EF4-FFF2-40B4-BE49-F238E27FC236}">
+                  <a16:creationId xmlns:a16="http://schemas.microsoft.com/office/drawing/2014/main" id="{D92814D8-16F5-4FEE-9760-2C4B0355BDC0}"/>
+                </a:ext>
+              </a:extLst>
+            </p:cNvPr>
+            <p:cNvCxnSpPr>
+              <a:stCxn id="4" idx="3"/>
+            </p:cNvCxnSpPr>
+            <p:nvPr/>
+          </p:nvCxnSpPr>
+          <p:spPr>
+            <a:xfrm flipV="1">
+              <a:off x="5943600" y="2465612"/>
+              <a:ext cx="2177143" cy="3"/>
+            </a:xfrm>
+            <a:prstGeom prst="straightConnector1">
+              <a:avLst/>
+            </a:prstGeom>
+            <a:ln w="254000">
+              <a:tailEnd type="triangle"/>
+            </a:ln>
+          </p:spPr>
+          <p:style>
+            <a:lnRef idx="1">
+              <a:schemeClr val="accent1"/>
+            </a:lnRef>
+            <a:fillRef idx="0">
+              <a:schemeClr val="accent1"/>
+            </a:fillRef>
+            <a:effectRef idx="0">
+              <a:schemeClr val="accent1"/>
+            </a:effectRef>
+            <a:fontRef idx="minor">
+              <a:schemeClr val="tx1"/>
+            </a:fontRef>
+          </p:style>
+        </p:cxnSp>
+        <mc:AlternateContent xmlns:mc="http://schemas.openxmlformats.org/markup-compatibility/2006">
+          <mc:Choice xmlns:a14="http://schemas.microsoft.com/office/drawing/2010/main" Requires="a14">
+            <p:sp>
+              <p:nvSpPr>
+                <p:cNvPr id="16" name="TextBox 15">
+                  <a:extLst>
+                    <a:ext uri="{FF2B5EF4-FFF2-40B4-BE49-F238E27FC236}">
+                      <a16:creationId xmlns:a16="http://schemas.microsoft.com/office/drawing/2014/main" id="{4C50734A-F1CA-46A1-92C2-E8AF43468CE4}"/>
+                    </a:ext>
+                  </a:extLst>
+                </p:cNvPr>
+                <p:cNvSpPr txBox="1"/>
+                <p:nvPr/>
+              </p:nvSpPr>
+              <p:spPr>
+                <a:xfrm>
+                  <a:off x="6276873" y="1293656"/>
+                  <a:ext cx="866968" cy="923330"/>
+                </a:xfrm>
+                <a:prstGeom prst="rect">
+                  <a:avLst/>
+                </a:prstGeom>
+                <a:noFill/>
+              </p:spPr>
+              <p:txBody>
+                <a:bodyPr wrap="none" rtlCol="0">
+                  <a:spAutoFit/>
+                </a:bodyPr>
+                <a:lstStyle/>
+                <a:p>
+                  <a14:m>
+                    <m:oMathPara xmlns:m="http://schemas.openxmlformats.org/officeDocument/2006/math">
+                      <m:oMathParaPr>
+                        <m:jc m:val="centerGroup"/>
+                      </m:oMathParaPr>
+                      <m:oMath xmlns:m="http://schemas.openxmlformats.org/officeDocument/2006/math">
+                        <m:r>
+                          <a:rPr lang="en-US" sz="5400" b="0" i="1" smtClean="0">
+                            <a:latin typeface="Cambria Math" panose="02040503050406030204" pitchFamily="18" charset="0"/>
+                          </a:rPr>
+                          <m:t>𝐻</m:t>
+                        </m:r>
+                      </m:oMath>
+                    </m:oMathPara>
+                  </a14:m>
+                  <a:endParaRPr lang="en-US" sz="5400" b="0" dirty="0"/>
+                </a:p>
+              </p:txBody>
+            </p:sp>
+          </mc:Choice>
+          <mc:Fallback>
+            <p:sp>
+              <p:nvSpPr>
+                <p:cNvPr id="16" name="TextBox 15">
+                  <a:extLst>
+                    <a:ext uri="{FF2B5EF4-FFF2-40B4-BE49-F238E27FC236}">
+                      <a16:creationId xmlns:a16="http://schemas.microsoft.com/office/drawing/2014/main" id="{4C50734A-F1CA-46A1-92C2-E8AF43468CE4}"/>
+                    </a:ext>
+                  </a:extLst>
+                </p:cNvPr>
+                <p:cNvSpPr txBox="1">
+                  <a:spLocks noRot="1" noChangeAspect="1" noMove="1" noResize="1" noEditPoints="1" noAdjustHandles="1" noChangeArrowheads="1" noChangeShapeType="1" noTextEdit="1"/>
+                </p:cNvSpPr>
+                <p:nvPr/>
+              </p:nvSpPr>
+              <p:spPr>
+                <a:xfrm>
+                  <a:off x="6276873" y="1293656"/>
+                  <a:ext cx="866968" cy="923330"/>
+                </a:xfrm>
+                <a:prstGeom prst="rect">
+                  <a:avLst/>
+                </a:prstGeom>
+                <a:blipFill>
+                  <a:blip r:embed="rId2"/>
+                  <a:stretch>
+                    <a:fillRect/>
+                  </a:stretch>
+                </a:blipFill>
+              </p:spPr>
+              <p:txBody>
+                <a:bodyPr/>
+                <a:lstStyle/>
+                <a:p>
+                  <a:r>
+                    <a:rPr lang="en-US">
+                      <a:noFill/>
+                    </a:rPr>
+                    <a:t> </a:t>
+                  </a:r>
+                </a:p>
+              </p:txBody>
+            </p:sp>
+          </mc:Fallback>
+        </mc:AlternateContent>
+      </p:grpSp>
+      <p:grpSp>
+        <p:nvGrpSpPr>
+          <p:cNvPr id="18" name="Group 17">
+            <a:extLst>
+              <a:ext uri="{FF2B5EF4-FFF2-40B4-BE49-F238E27FC236}">
+                <a16:creationId xmlns:a16="http://schemas.microsoft.com/office/drawing/2014/main" id="{CA1726E2-C643-43D9-B432-0AF5111131D9}"/>
+              </a:ext>
+            </a:extLst>
+          </p:cNvPr>
+          <p:cNvGrpSpPr/>
+          <p:nvPr/>
+        </p:nvGrpSpPr>
+        <p:grpSpPr>
+          <a:xfrm>
+            <a:off x="13162039" y="1283442"/>
+            <a:ext cx="2177143" cy="1171959"/>
+            <a:chOff x="5943600" y="1293656"/>
+            <a:chExt cx="2177143" cy="1171959"/>
+          </a:xfrm>
+        </p:grpSpPr>
+        <p:cxnSp>
+          <p:nvCxnSpPr>
+            <p:cNvPr id="19" name="Straight Arrow Connector 18">
+              <a:extLst>
+                <a:ext uri="{FF2B5EF4-FFF2-40B4-BE49-F238E27FC236}">
+                  <a16:creationId xmlns:a16="http://schemas.microsoft.com/office/drawing/2014/main" id="{E82A531E-9943-4F87-BBC4-926E77CEA5F6}"/>
+                </a:ext>
+              </a:extLst>
+            </p:cNvPr>
+            <p:cNvCxnSpPr/>
+            <p:nvPr/>
+          </p:nvCxnSpPr>
+          <p:spPr>
+            <a:xfrm flipV="1">
+              <a:off x="5943600" y="2465612"/>
+              <a:ext cx="2177143" cy="3"/>
+            </a:xfrm>
+            <a:prstGeom prst="straightConnector1">
+              <a:avLst/>
+            </a:prstGeom>
+            <a:ln w="254000">
+              <a:tailEnd type="triangle"/>
+            </a:ln>
+          </p:spPr>
+          <p:style>
+            <a:lnRef idx="1">
+              <a:schemeClr val="accent1"/>
+            </a:lnRef>
+            <a:fillRef idx="0">
+              <a:schemeClr val="accent1"/>
+            </a:fillRef>
+            <a:effectRef idx="0">
+              <a:schemeClr val="accent1"/>
+            </a:effectRef>
+            <a:fontRef idx="minor">
+              <a:schemeClr val="tx1"/>
+            </a:fontRef>
+          </p:style>
+        </p:cxnSp>
+        <mc:AlternateContent xmlns:mc="http://schemas.openxmlformats.org/markup-compatibility/2006">
+          <mc:Choice xmlns:a14="http://schemas.microsoft.com/office/drawing/2010/main" Requires="a14">
+            <p:sp>
+              <p:nvSpPr>
+                <p:cNvPr id="20" name="TextBox 19">
+                  <a:extLst>
+                    <a:ext uri="{FF2B5EF4-FFF2-40B4-BE49-F238E27FC236}">
+                      <a16:creationId xmlns:a16="http://schemas.microsoft.com/office/drawing/2014/main" id="{1CCD2581-1836-49B9-A665-F059C1481819}"/>
+                    </a:ext>
+                  </a:extLst>
+                </p:cNvPr>
+                <p:cNvSpPr txBox="1"/>
+                <p:nvPr/>
+              </p:nvSpPr>
+              <p:spPr>
+                <a:xfrm>
+                  <a:off x="6276873" y="1293656"/>
+                  <a:ext cx="1075166" cy="923330"/>
+                </a:xfrm>
+                <a:prstGeom prst="rect">
+                  <a:avLst/>
+                </a:prstGeom>
+                <a:noFill/>
+              </p:spPr>
+              <p:txBody>
+                <a:bodyPr wrap="none" rtlCol="0">
+                  <a:spAutoFit/>
+                </a:bodyPr>
+                <a:lstStyle/>
+                <a:p>
+                  <a14:m>
+                    <m:oMathPara xmlns:m="http://schemas.openxmlformats.org/officeDocument/2006/math">
+                      <m:oMathParaPr>
+                        <m:jc m:val="centerGroup"/>
+                      </m:oMathParaPr>
+                      <m:oMath xmlns:m="http://schemas.openxmlformats.org/officeDocument/2006/math">
+                        <m:sSub>
+                          <m:sSubPr>
+                            <m:ctrlPr>
+                              <a:rPr lang="en-US" sz="5400" b="0" i="1" smtClean="0">
+                                <a:latin typeface="Cambria Math" panose="02040503050406030204" pitchFamily="18" charset="0"/>
+                              </a:rPr>
+                            </m:ctrlPr>
+                          </m:sSubPr>
+                          <m:e>
+                            <m:r>
+                              <a:rPr lang="en-US" sz="5400" b="0" i="1" smtClean="0">
+                                <a:latin typeface="Cambria Math" panose="02040503050406030204" pitchFamily="18" charset="0"/>
+                              </a:rPr>
+                              <m:t>𝑅</m:t>
+                            </m:r>
+                          </m:e>
+                          <m:sub>
+                            <m:r>
+                              <a:rPr lang="en-US" sz="5400" b="0" i="1" smtClean="0">
+                                <a:latin typeface="Cambria Math" panose="02040503050406030204" pitchFamily="18" charset="0"/>
+                              </a:rPr>
+                              <m:t>1</m:t>
+                            </m:r>
+                          </m:sub>
+                        </m:sSub>
+                      </m:oMath>
+                    </m:oMathPara>
+                  </a14:m>
+                  <a:endParaRPr lang="en-US" sz="5400" b="0" dirty="0"/>
+                </a:p>
+              </p:txBody>
+            </p:sp>
+          </mc:Choice>
+          <mc:Fallback>
+            <p:sp>
+              <p:nvSpPr>
+                <p:cNvPr id="20" name="TextBox 19">
+                  <a:extLst>
+                    <a:ext uri="{FF2B5EF4-FFF2-40B4-BE49-F238E27FC236}">
+                      <a16:creationId xmlns:a16="http://schemas.microsoft.com/office/drawing/2014/main" id="{1CCD2581-1836-49B9-A665-F059C1481819}"/>
+                    </a:ext>
+                  </a:extLst>
+                </p:cNvPr>
+                <p:cNvSpPr txBox="1">
+                  <a:spLocks noRot="1" noChangeAspect="1" noMove="1" noResize="1" noEditPoints="1" noAdjustHandles="1" noChangeArrowheads="1" noChangeShapeType="1" noTextEdit="1"/>
+                </p:cNvSpPr>
+                <p:nvPr/>
+              </p:nvSpPr>
+              <p:spPr>
+                <a:xfrm>
+                  <a:off x="6276873" y="1293656"/>
+                  <a:ext cx="1075166" cy="923330"/>
+                </a:xfrm>
+                <a:prstGeom prst="rect">
+                  <a:avLst/>
+                </a:prstGeom>
+                <a:blipFill>
+                  <a:blip r:embed="rId3"/>
+                  <a:stretch>
+                    <a:fillRect/>
+                  </a:stretch>
+                </a:blipFill>
+              </p:spPr>
+              <p:txBody>
+                <a:bodyPr/>
+                <a:lstStyle/>
+                <a:p>
+                  <a:r>
+                    <a:rPr lang="en-US">
+                      <a:noFill/>
+                    </a:rPr>
+                    <a:t> </a:t>
+                  </a:r>
+                </a:p>
+              </p:txBody>
+            </p:sp>
+          </mc:Fallback>
+        </mc:AlternateContent>
+      </p:grpSp>
+      <p:grpSp>
+        <p:nvGrpSpPr>
+          <p:cNvPr id="21" name="Group 20">
+            <a:extLst>
+              <a:ext uri="{FF2B5EF4-FFF2-40B4-BE49-F238E27FC236}">
+                <a16:creationId xmlns:a16="http://schemas.microsoft.com/office/drawing/2014/main" id="{F9AE6D71-0976-4D4F-A54D-02B214DA7B50}"/>
+              </a:ext>
+            </a:extLst>
+          </p:cNvPr>
+          <p:cNvGrpSpPr/>
+          <p:nvPr/>
+        </p:nvGrpSpPr>
+        <p:grpSpPr>
+          <a:xfrm>
+            <a:off x="27660600" y="1317276"/>
+            <a:ext cx="2177143" cy="1171959"/>
+            <a:chOff x="5943600" y="1293656"/>
+            <a:chExt cx="2177143" cy="1171959"/>
+          </a:xfrm>
+        </p:grpSpPr>
+        <p:cxnSp>
+          <p:nvCxnSpPr>
+            <p:cNvPr id="22" name="Straight Arrow Connector 21">
+              <a:extLst>
+                <a:ext uri="{FF2B5EF4-FFF2-40B4-BE49-F238E27FC236}">
+                  <a16:creationId xmlns:a16="http://schemas.microsoft.com/office/drawing/2014/main" id="{6E2D8F86-3FC7-4130-9090-6C7616A78B8D}"/>
+                </a:ext>
+              </a:extLst>
+            </p:cNvPr>
+            <p:cNvCxnSpPr/>
+            <p:nvPr/>
+          </p:nvCxnSpPr>
+          <p:spPr>
+            <a:xfrm flipV="1">
+              <a:off x="5943600" y="2465612"/>
+              <a:ext cx="2177143" cy="3"/>
+            </a:xfrm>
+            <a:prstGeom prst="straightConnector1">
+              <a:avLst/>
+            </a:prstGeom>
+            <a:ln w="254000">
+              <a:tailEnd type="triangle"/>
+            </a:ln>
+          </p:spPr>
+          <p:style>
+            <a:lnRef idx="1">
+              <a:schemeClr val="accent1"/>
+            </a:lnRef>
+            <a:fillRef idx="0">
+              <a:schemeClr val="accent1"/>
+            </a:fillRef>
+            <a:effectRef idx="0">
+              <a:schemeClr val="accent1"/>
+            </a:effectRef>
+            <a:fontRef idx="minor">
+              <a:schemeClr val="tx1"/>
+            </a:fontRef>
+          </p:style>
+        </p:cxnSp>
+        <mc:AlternateContent xmlns:mc="http://schemas.openxmlformats.org/markup-compatibility/2006">
+          <mc:Choice xmlns:a14="http://schemas.microsoft.com/office/drawing/2010/main" Requires="a14">
+            <p:sp>
+              <p:nvSpPr>
+                <p:cNvPr id="23" name="TextBox 22">
+                  <a:extLst>
+                    <a:ext uri="{FF2B5EF4-FFF2-40B4-BE49-F238E27FC236}">
+                      <a16:creationId xmlns:a16="http://schemas.microsoft.com/office/drawing/2014/main" id="{ABF5A5BB-485D-48DE-84E0-6A81E23930FF}"/>
+                    </a:ext>
+                  </a:extLst>
+                </p:cNvPr>
+                <p:cNvSpPr txBox="1"/>
+                <p:nvPr/>
+              </p:nvSpPr>
+              <p:spPr>
+                <a:xfrm>
+                  <a:off x="6276873" y="1293656"/>
+                  <a:ext cx="1091196" cy="923330"/>
+                </a:xfrm>
+                <a:prstGeom prst="rect">
+                  <a:avLst/>
+                </a:prstGeom>
+                <a:noFill/>
+              </p:spPr>
+              <p:txBody>
+                <a:bodyPr wrap="none" rtlCol="0">
+                  <a:spAutoFit/>
+                </a:bodyPr>
+                <a:lstStyle/>
+                <a:p>
+                  <a14:m>
+                    <m:oMathPara xmlns:m="http://schemas.openxmlformats.org/officeDocument/2006/math">
+                      <m:oMathParaPr>
+                        <m:jc m:val="centerGroup"/>
+                      </m:oMathParaPr>
+                      <m:oMath xmlns:m="http://schemas.openxmlformats.org/officeDocument/2006/math">
+                        <m:sSub>
+                          <m:sSubPr>
+                            <m:ctrlPr>
+                              <a:rPr lang="en-US" sz="5400" b="0" i="1" smtClean="0">
+                                <a:latin typeface="Cambria Math" panose="02040503050406030204" pitchFamily="18" charset="0"/>
+                              </a:rPr>
+                            </m:ctrlPr>
+                          </m:sSubPr>
+                          <m:e>
+                            <m:r>
+                              <a:rPr lang="en-US" sz="5400" b="0" i="1" smtClean="0">
+                                <a:latin typeface="Cambria Math" panose="02040503050406030204" pitchFamily="18" charset="0"/>
+                              </a:rPr>
+                              <m:t>𝑅</m:t>
+                            </m:r>
+                          </m:e>
+                          <m:sub>
+                            <m:r>
+                              <a:rPr lang="en-US" sz="5400" b="0" i="1" smtClean="0">
+                                <a:latin typeface="Cambria Math" panose="02040503050406030204" pitchFamily="18" charset="0"/>
+                              </a:rPr>
+                              <m:t>2</m:t>
+                            </m:r>
+                          </m:sub>
+                        </m:sSub>
+                      </m:oMath>
+                    </m:oMathPara>
+                  </a14:m>
+                  <a:endParaRPr lang="en-US" sz="5400" b="0" dirty="0"/>
+                </a:p>
+              </p:txBody>
+            </p:sp>
+          </mc:Choice>
+          <mc:Fallback>
+            <p:sp>
+              <p:nvSpPr>
+                <p:cNvPr id="23" name="TextBox 22">
+                  <a:extLst>
+                    <a:ext uri="{FF2B5EF4-FFF2-40B4-BE49-F238E27FC236}">
+                      <a16:creationId xmlns:a16="http://schemas.microsoft.com/office/drawing/2014/main" id="{ABF5A5BB-485D-48DE-84E0-6A81E23930FF}"/>
+                    </a:ext>
+                  </a:extLst>
+                </p:cNvPr>
+                <p:cNvSpPr txBox="1">
+                  <a:spLocks noRot="1" noChangeAspect="1" noMove="1" noResize="1" noEditPoints="1" noAdjustHandles="1" noChangeArrowheads="1" noChangeShapeType="1" noTextEdit="1"/>
+                </p:cNvSpPr>
+                <p:nvPr/>
+              </p:nvSpPr>
+              <p:spPr>
+                <a:xfrm>
+                  <a:off x="6276873" y="1293656"/>
+                  <a:ext cx="1091196" cy="923330"/>
+                </a:xfrm>
+                <a:prstGeom prst="rect">
+                  <a:avLst/>
+                </a:prstGeom>
+                <a:blipFill>
+                  <a:blip r:embed="rId4"/>
+                  <a:stretch>
+                    <a:fillRect/>
+                  </a:stretch>
+                </a:blipFill>
+              </p:spPr>
+              <p:txBody>
+                <a:bodyPr/>
+                <a:lstStyle/>
+                <a:p>
+                  <a:r>
+                    <a:rPr lang="en-US">
+                      <a:noFill/>
+                    </a:rPr>
+                    <a:t> </a:t>
+                  </a:r>
+                </a:p>
+              </p:txBody>
+            </p:sp>
+          </mc:Fallback>
+        </mc:AlternateContent>
+      </p:grpSp>
+      <p:grpSp>
+        <p:nvGrpSpPr>
+          <p:cNvPr id="24" name="Group 23">
+            <a:extLst>
+              <a:ext uri="{FF2B5EF4-FFF2-40B4-BE49-F238E27FC236}">
+                <a16:creationId xmlns:a16="http://schemas.microsoft.com/office/drawing/2014/main" id="{4D4D7DE6-8179-45B3-92F8-02D5F3607D9E}"/>
+              </a:ext>
+            </a:extLst>
+          </p:cNvPr>
+          <p:cNvGrpSpPr/>
+          <p:nvPr/>
+        </p:nvGrpSpPr>
+        <p:grpSpPr>
+          <a:xfrm>
+            <a:off x="20445133" y="1349827"/>
+            <a:ext cx="2177143" cy="1171959"/>
+            <a:chOff x="5943600" y="1293656"/>
+            <a:chExt cx="2177143" cy="1171959"/>
+          </a:xfrm>
+        </p:grpSpPr>
+        <p:cxnSp>
+          <p:nvCxnSpPr>
+            <p:cNvPr id="25" name="Straight Arrow Connector 24">
+              <a:extLst>
+                <a:ext uri="{FF2B5EF4-FFF2-40B4-BE49-F238E27FC236}">
+                  <a16:creationId xmlns:a16="http://schemas.microsoft.com/office/drawing/2014/main" id="{D5E996D8-A4F9-44C5-B964-47AA3AA9E7E3}"/>
+                </a:ext>
+              </a:extLst>
+            </p:cNvPr>
+            <p:cNvCxnSpPr/>
+            <p:nvPr/>
+          </p:nvCxnSpPr>
+          <p:spPr>
+            <a:xfrm flipV="1">
+              <a:off x="5943600" y="2465612"/>
+              <a:ext cx="2177143" cy="3"/>
+            </a:xfrm>
+            <a:prstGeom prst="straightConnector1">
+              <a:avLst/>
+            </a:prstGeom>
+            <a:ln w="254000">
+              <a:tailEnd type="triangle"/>
+            </a:ln>
+          </p:spPr>
+          <p:style>
+            <a:lnRef idx="1">
+              <a:schemeClr val="accent1"/>
+            </a:lnRef>
+            <a:fillRef idx="0">
+              <a:schemeClr val="accent1"/>
+            </a:fillRef>
+            <a:effectRef idx="0">
+              <a:schemeClr val="accent1"/>
+            </a:effectRef>
+            <a:fontRef idx="minor">
+              <a:schemeClr val="tx1"/>
+            </a:fontRef>
+          </p:style>
+        </p:cxnSp>
+        <mc:AlternateContent xmlns:mc="http://schemas.openxmlformats.org/markup-compatibility/2006">
+          <mc:Choice xmlns:a14="http://schemas.microsoft.com/office/drawing/2010/main" Requires="a14">
+            <p:sp>
+              <p:nvSpPr>
+                <p:cNvPr id="26" name="TextBox 25">
+                  <a:extLst>
+                    <a:ext uri="{FF2B5EF4-FFF2-40B4-BE49-F238E27FC236}">
+                      <a16:creationId xmlns:a16="http://schemas.microsoft.com/office/drawing/2014/main" id="{612C6725-CFE6-4C7E-B26F-B74ED36412A6}"/>
+                    </a:ext>
+                  </a:extLst>
+                </p:cNvPr>
+                <p:cNvSpPr txBox="1"/>
+                <p:nvPr/>
+              </p:nvSpPr>
+              <p:spPr>
+                <a:xfrm>
+                  <a:off x="6276873" y="1293656"/>
+                  <a:ext cx="866968" cy="923330"/>
+                </a:xfrm>
+                <a:prstGeom prst="rect">
+                  <a:avLst/>
+                </a:prstGeom>
+                <a:noFill/>
+              </p:spPr>
+              <p:txBody>
+                <a:bodyPr wrap="none" rtlCol="0">
+                  <a:spAutoFit/>
+                </a:bodyPr>
+                <a:lstStyle/>
+                <a:p>
+                  <a14:m>
+                    <m:oMathPara xmlns:m="http://schemas.openxmlformats.org/officeDocument/2006/math">
+                      <m:oMathParaPr>
+                        <m:jc m:val="centerGroup"/>
+                      </m:oMathParaPr>
+                      <m:oMath xmlns:m="http://schemas.openxmlformats.org/officeDocument/2006/math">
+                        <m:r>
+                          <a:rPr lang="en-US" sz="5400" b="0" i="1" smtClean="0">
+                            <a:latin typeface="Cambria Math" panose="02040503050406030204" pitchFamily="18" charset="0"/>
+                          </a:rPr>
+                          <m:t>𝐻</m:t>
+                        </m:r>
+                      </m:oMath>
+                    </m:oMathPara>
+                  </a14:m>
+                  <a:endParaRPr lang="en-US" sz="5400" b="0" dirty="0"/>
+                </a:p>
+              </p:txBody>
+            </p:sp>
+          </mc:Choice>
+          <mc:Fallback>
+            <p:sp>
+              <p:nvSpPr>
+                <p:cNvPr id="26" name="TextBox 25">
+                  <a:extLst>
+                    <a:ext uri="{FF2B5EF4-FFF2-40B4-BE49-F238E27FC236}">
+                      <a16:creationId xmlns:a16="http://schemas.microsoft.com/office/drawing/2014/main" id="{612C6725-CFE6-4C7E-B26F-B74ED36412A6}"/>
+                    </a:ext>
+                  </a:extLst>
+                </p:cNvPr>
+                <p:cNvSpPr txBox="1">
+                  <a:spLocks noRot="1" noChangeAspect="1" noMove="1" noResize="1" noEditPoints="1" noAdjustHandles="1" noChangeArrowheads="1" noChangeShapeType="1" noTextEdit="1"/>
+                </p:cNvSpPr>
+                <p:nvPr/>
+              </p:nvSpPr>
+              <p:spPr>
+                <a:xfrm>
+                  <a:off x="6276873" y="1293656"/>
+                  <a:ext cx="866968" cy="923330"/>
+                </a:xfrm>
+                <a:prstGeom prst="rect">
+                  <a:avLst/>
+                </a:prstGeom>
+                <a:blipFill>
+                  <a:blip r:embed="rId5"/>
+                  <a:stretch>
+                    <a:fillRect/>
+                  </a:stretch>
+                </a:blipFill>
+              </p:spPr>
+              <p:txBody>
+                <a:bodyPr/>
+                <a:lstStyle/>
+                <a:p>
+                  <a:r>
+                    <a:rPr lang="en-US">
+                      <a:noFill/>
+                    </a:rPr>
+                    <a:t> </a:t>
+                  </a:r>
+                </a:p>
+              </p:txBody>
+            </p:sp>
+          </mc:Fallback>
+        </mc:AlternateContent>
+      </p:grpSp>
+      <p:sp>
+        <p:nvSpPr>
+          <p:cNvPr id="30" name="Rectangle: Rounded Corners 29">
+            <a:extLst>
+              <a:ext uri="{FF2B5EF4-FFF2-40B4-BE49-F238E27FC236}">
+                <a16:creationId xmlns:a16="http://schemas.microsoft.com/office/drawing/2014/main" id="{6EE9138B-E4FB-4EF6-9C11-7C25D2C12C22}"/>
+              </a:ext>
+            </a:extLst>
+          </p:cNvPr>
+          <p:cNvSpPr/>
+          <p:nvPr/>
+        </p:nvSpPr>
+        <p:spPr>
+          <a:xfrm>
+            <a:off x="881743" y="5736772"/>
+            <a:ext cx="5061857" cy="2841171"/>
+          </a:xfrm>
+          <a:prstGeom prst="roundRect">
+            <a:avLst/>
+          </a:prstGeom>
+        </p:spPr>
+        <p:style>
+          <a:lnRef idx="2">
+            <a:schemeClr val="accent2">
+              <a:shade val="50000"/>
+            </a:schemeClr>
+          </a:lnRef>
+          <a:fillRef idx="1">
+            <a:schemeClr val="accent2"/>
+          </a:fillRef>
+          <a:effectRef idx="0">
+            <a:schemeClr val="accent2"/>
+          </a:effectRef>
+          <a:fontRef idx="minor">
+            <a:schemeClr val="lt1"/>
+          </a:fontRef>
+        </p:style>
+        <p:txBody>
+          <a:bodyPr rtlCol="0" anchor="ctr"/>
+          <a:lstStyle/>
+          <a:p>
+            <a:pPr algn="ctr"/>
+            <a:r>
+              <a:rPr lang="en-US" sz="6600" dirty="0"/>
+              <a:t>no</a:t>
+            </a:r>
+          </a:p>
+        </p:txBody>
+      </p:sp>
+      <p:sp>
+        <p:nvSpPr>
+          <p:cNvPr id="31" name="Rectangle: Rounded Corners 30">
+            <a:extLst>
+              <a:ext uri="{FF2B5EF4-FFF2-40B4-BE49-F238E27FC236}">
+                <a16:creationId xmlns:a16="http://schemas.microsoft.com/office/drawing/2014/main" id="{E6803613-FFB2-4A66-A7C8-B0608CFEFC03}"/>
+              </a:ext>
+            </a:extLst>
+          </p:cNvPr>
+          <p:cNvSpPr/>
+          <p:nvPr/>
+        </p:nvSpPr>
+        <p:spPr>
+          <a:xfrm>
+            <a:off x="8120743" y="5736772"/>
+            <a:ext cx="5061857" cy="2841171"/>
+          </a:xfrm>
+          <a:prstGeom prst="roundRect">
+            <a:avLst/>
+          </a:prstGeom>
+        </p:spPr>
+        <p:style>
+          <a:lnRef idx="1">
+            <a:schemeClr val="accent2"/>
+          </a:lnRef>
+          <a:fillRef idx="2">
+            <a:schemeClr val="accent2"/>
+          </a:fillRef>
+          <a:effectRef idx="1">
+            <a:schemeClr val="accent2"/>
+          </a:effectRef>
+          <a:fontRef idx="minor">
+            <a:schemeClr val="dk1"/>
+          </a:fontRef>
+        </p:style>
+        <p:txBody>
+          <a:bodyPr rtlCol="0" anchor="ctr"/>
+          <a:lstStyle/>
+          <a:p>
+            <a:pPr algn="ctr"/>
+            <a:r>
+              <a:rPr lang="en-US" sz="6600" dirty="0"/>
+              <a:t>229811</a:t>
+            </a:r>
+          </a:p>
+        </p:txBody>
+      </p:sp>
+      <p:sp>
+        <p:nvSpPr>
+          <p:cNvPr id="32" name="Rectangle: Rounded Corners 31">
+            <a:extLst>
+              <a:ext uri="{FF2B5EF4-FFF2-40B4-BE49-F238E27FC236}">
+                <a16:creationId xmlns:a16="http://schemas.microsoft.com/office/drawing/2014/main" id="{88348C60-DAF6-4C03-B87A-DFD21C51EA8B}"/>
+              </a:ext>
+            </a:extLst>
+          </p:cNvPr>
+          <p:cNvSpPr/>
+          <p:nvPr/>
+        </p:nvSpPr>
+        <p:spPr>
+          <a:xfrm>
+            <a:off x="22598743" y="5736771"/>
+            <a:ext cx="5061857" cy="2841171"/>
+          </a:xfrm>
+          <a:prstGeom prst="roundRect">
+            <a:avLst/>
+          </a:prstGeom>
+        </p:spPr>
+        <p:style>
+          <a:lnRef idx="1">
+            <a:schemeClr val="accent2"/>
+          </a:lnRef>
+          <a:fillRef idx="2">
+            <a:schemeClr val="accent2"/>
+          </a:fillRef>
+          <a:effectRef idx="1">
+            <a:schemeClr val="accent2"/>
+          </a:effectRef>
+          <a:fontRef idx="minor">
+            <a:schemeClr val="dk1"/>
+          </a:fontRef>
+        </p:style>
+        <p:txBody>
+          <a:bodyPr rtlCol="0" anchor="ctr"/>
+          <a:lstStyle/>
+          <a:p>
+            <a:pPr algn="ctr"/>
+            <a:r>
+              <a:rPr lang="en-US" sz="6600" dirty="0"/>
+              <a:t>78a109</a:t>
+            </a:r>
+          </a:p>
+        </p:txBody>
+      </p:sp>
+      <p:sp>
+        <p:nvSpPr>
+          <p:cNvPr id="33" name="Rectangle: Rounded Corners 32">
+            <a:extLst>
+              <a:ext uri="{FF2B5EF4-FFF2-40B4-BE49-F238E27FC236}">
+                <a16:creationId xmlns:a16="http://schemas.microsoft.com/office/drawing/2014/main" id="{0FA18340-57A4-4835-949C-38DD164CD52E}"/>
+              </a:ext>
+            </a:extLst>
+          </p:cNvPr>
+          <p:cNvSpPr/>
+          <p:nvPr/>
+        </p:nvSpPr>
+        <p:spPr>
+          <a:xfrm>
+            <a:off x="15359743" y="5736772"/>
+            <a:ext cx="5061857" cy="2841171"/>
+          </a:xfrm>
+          <a:prstGeom prst="roundRect">
+            <a:avLst/>
+          </a:prstGeom>
+        </p:spPr>
+        <p:style>
+          <a:lnRef idx="2">
+            <a:schemeClr val="accent2">
+              <a:shade val="50000"/>
+            </a:schemeClr>
+          </a:lnRef>
+          <a:fillRef idx="1">
+            <a:schemeClr val="accent2"/>
+          </a:fillRef>
+          <a:effectRef idx="0">
+            <a:schemeClr val="accent2"/>
+          </a:effectRef>
+          <a:fontRef idx="minor">
+            <a:schemeClr val="lt1"/>
+          </a:fontRef>
+        </p:style>
+        <p:txBody>
+          <a:bodyPr rtlCol="0" anchor="ctr"/>
+          <a:lstStyle/>
+          <a:p>
+            <a:pPr algn="ctr"/>
+            <a:r>
+              <a:rPr lang="en-US" sz="6600" dirty="0"/>
+              <a:t>more</a:t>
+            </a:r>
+          </a:p>
+        </p:txBody>
+      </p:sp>
+      <p:sp>
+        <p:nvSpPr>
+          <p:cNvPr id="34" name="Rectangle: Rounded Corners 33">
+            <a:extLst>
+              <a:ext uri="{FF2B5EF4-FFF2-40B4-BE49-F238E27FC236}">
+                <a16:creationId xmlns:a16="http://schemas.microsoft.com/office/drawing/2014/main" id="{095FCDC6-8671-47D6-8DCA-73C294011765}"/>
+              </a:ext>
+            </a:extLst>
+          </p:cNvPr>
+          <p:cNvSpPr/>
+          <p:nvPr/>
+        </p:nvSpPr>
+        <p:spPr>
+          <a:xfrm>
+            <a:off x="29837743" y="5736770"/>
+            <a:ext cx="5061857" cy="2841171"/>
+          </a:xfrm>
+          <a:prstGeom prst="roundRect">
+            <a:avLst/>
+          </a:prstGeom>
+        </p:spPr>
+        <p:style>
+          <a:lnRef idx="2">
+            <a:schemeClr val="accent2">
+              <a:shade val="50000"/>
+            </a:schemeClr>
+          </a:lnRef>
+          <a:fillRef idx="1">
+            <a:schemeClr val="accent2"/>
+          </a:fillRef>
+          <a:effectRef idx="0">
+            <a:schemeClr val="accent2"/>
+          </a:effectRef>
+          <a:fontRef idx="minor">
+            <a:schemeClr val="lt1"/>
+          </a:fontRef>
+        </p:style>
+        <p:txBody>
+          <a:bodyPr rtlCol="0" anchor="ctr"/>
+          <a:lstStyle/>
+          <a:p>
+            <a:pPr algn="ctr"/>
+            <a:r>
+              <a:rPr lang="en-US" sz="6600" dirty="0"/>
+              <a:t>merge</a:t>
+            </a:r>
+          </a:p>
+        </p:txBody>
+      </p:sp>
+      <p:grpSp>
+        <p:nvGrpSpPr>
+          <p:cNvPr id="35" name="Group 34">
+            <a:extLst>
+              <a:ext uri="{FF2B5EF4-FFF2-40B4-BE49-F238E27FC236}">
+                <a16:creationId xmlns:a16="http://schemas.microsoft.com/office/drawing/2014/main" id="{9CA1CDBE-3AC4-4386-811E-F4C851D55624}"/>
+              </a:ext>
+            </a:extLst>
+          </p:cNvPr>
+          <p:cNvGrpSpPr/>
+          <p:nvPr/>
+        </p:nvGrpSpPr>
+        <p:grpSpPr>
+          <a:xfrm>
+            <a:off x="5943600" y="5985399"/>
+            <a:ext cx="2177143" cy="1195576"/>
+            <a:chOff x="5791200" y="1293656"/>
+            <a:chExt cx="2177143" cy="5711302"/>
+          </a:xfrm>
+        </p:grpSpPr>
+        <p:cxnSp>
+          <p:nvCxnSpPr>
+            <p:cNvPr id="36" name="Straight Arrow Connector 35">
+              <a:extLst>
+                <a:ext uri="{FF2B5EF4-FFF2-40B4-BE49-F238E27FC236}">
+                  <a16:creationId xmlns:a16="http://schemas.microsoft.com/office/drawing/2014/main" id="{FFC1C728-E05A-4E22-972E-2D9C1106118D}"/>
+                </a:ext>
+              </a:extLst>
+            </p:cNvPr>
+            <p:cNvCxnSpPr>
+              <a:stCxn id="30" idx="3"/>
+            </p:cNvCxnSpPr>
+            <p:nvPr/>
+          </p:nvCxnSpPr>
+          <p:spPr>
+            <a:xfrm flipV="1">
+              <a:off x="5791200" y="7004955"/>
+              <a:ext cx="2177143" cy="3"/>
+            </a:xfrm>
+            <a:prstGeom prst="straightConnector1">
+              <a:avLst/>
+            </a:prstGeom>
+            <a:ln w="254000">
+              <a:tailEnd type="triangle"/>
+            </a:ln>
+          </p:spPr>
+          <p:style>
+            <a:lnRef idx="1">
+              <a:schemeClr val="accent1"/>
+            </a:lnRef>
+            <a:fillRef idx="0">
+              <a:schemeClr val="accent1"/>
+            </a:fillRef>
+            <a:effectRef idx="0">
+              <a:schemeClr val="accent1"/>
+            </a:effectRef>
+            <a:fontRef idx="minor">
+              <a:schemeClr val="tx1"/>
+            </a:fontRef>
+          </p:style>
+        </p:cxnSp>
+        <mc:AlternateContent xmlns:mc="http://schemas.openxmlformats.org/markup-compatibility/2006">
+          <mc:Choice xmlns:a14="http://schemas.microsoft.com/office/drawing/2010/main" Requires="a14">
+            <p:sp>
+              <p:nvSpPr>
+                <p:cNvPr id="37" name="TextBox 36">
+                  <a:extLst>
+                    <a:ext uri="{FF2B5EF4-FFF2-40B4-BE49-F238E27FC236}">
+                      <a16:creationId xmlns:a16="http://schemas.microsoft.com/office/drawing/2014/main" id="{A0F0C1F9-5EAB-4469-8350-E3E9B3505DD8}"/>
+                    </a:ext>
+                  </a:extLst>
+                </p:cNvPr>
+                <p:cNvSpPr txBox="1"/>
+                <p:nvPr/>
+              </p:nvSpPr>
+              <p:spPr>
+                <a:xfrm>
+                  <a:off x="6276873" y="1293656"/>
+                  <a:ext cx="866968" cy="923330"/>
+                </a:xfrm>
+                <a:prstGeom prst="rect">
+                  <a:avLst/>
+                </a:prstGeom>
+                <a:noFill/>
+              </p:spPr>
+              <p:txBody>
+                <a:bodyPr wrap="none" rtlCol="0">
+                  <a:spAutoFit/>
+                </a:bodyPr>
+                <a:lstStyle/>
+                <a:p>
+                  <a14:m>
+                    <m:oMathPara xmlns:m="http://schemas.openxmlformats.org/officeDocument/2006/math">
+                      <m:oMathParaPr>
+                        <m:jc m:val="centerGroup"/>
+                      </m:oMathParaPr>
+                      <m:oMath xmlns:m="http://schemas.openxmlformats.org/officeDocument/2006/math">
+                        <m:r>
+                          <a:rPr lang="en-US" sz="5400" b="0" i="1" smtClean="0">
+                            <a:latin typeface="Cambria Math" panose="02040503050406030204" pitchFamily="18" charset="0"/>
+                          </a:rPr>
+                          <m:t>𝐻</m:t>
+                        </m:r>
+                      </m:oMath>
+                    </m:oMathPara>
+                  </a14:m>
+                  <a:endParaRPr lang="en-US" sz="5400" b="0" dirty="0"/>
+                </a:p>
+              </p:txBody>
+            </p:sp>
+          </mc:Choice>
+          <mc:Fallback>
+            <p:sp>
+              <p:nvSpPr>
+                <p:cNvPr id="37" name="TextBox 36">
+                  <a:extLst>
+                    <a:ext uri="{FF2B5EF4-FFF2-40B4-BE49-F238E27FC236}">
+                      <a16:creationId xmlns:a16="http://schemas.microsoft.com/office/drawing/2014/main" id="{A0F0C1F9-5EAB-4469-8350-E3E9B3505DD8}"/>
+                    </a:ext>
+                  </a:extLst>
+                </p:cNvPr>
+                <p:cNvSpPr txBox="1">
+                  <a:spLocks noRot="1" noChangeAspect="1" noMove="1" noResize="1" noEditPoints="1" noAdjustHandles="1" noChangeArrowheads="1" noChangeShapeType="1" noTextEdit="1"/>
+                </p:cNvSpPr>
+                <p:nvPr/>
+              </p:nvSpPr>
+              <p:spPr>
+                <a:xfrm>
+                  <a:off x="6276873" y="1293656"/>
+                  <a:ext cx="866968" cy="923330"/>
+                </a:xfrm>
+                <a:prstGeom prst="rect">
+                  <a:avLst/>
+                </a:prstGeom>
+                <a:blipFill>
+                  <a:blip r:embed="rId6"/>
+                  <a:stretch>
+                    <a:fillRect b="-256250"/>
+                  </a:stretch>
+                </a:blipFill>
+              </p:spPr>
+              <p:txBody>
+                <a:bodyPr/>
+                <a:lstStyle/>
+                <a:p>
+                  <a:r>
+                    <a:rPr lang="en-US">
+                      <a:noFill/>
+                    </a:rPr>
+                    <a:t> </a:t>
+                  </a:r>
+                </a:p>
+              </p:txBody>
+            </p:sp>
+          </mc:Fallback>
+        </mc:AlternateContent>
+      </p:grpSp>
+      <p:grpSp>
+        <p:nvGrpSpPr>
+          <p:cNvPr id="38" name="Group 37">
+            <a:extLst>
+              <a:ext uri="{FF2B5EF4-FFF2-40B4-BE49-F238E27FC236}">
+                <a16:creationId xmlns:a16="http://schemas.microsoft.com/office/drawing/2014/main" id="{D5CC52D8-ADB7-42A7-B283-FE8DC67B3011}"/>
+              </a:ext>
+            </a:extLst>
+          </p:cNvPr>
+          <p:cNvGrpSpPr/>
+          <p:nvPr/>
+        </p:nvGrpSpPr>
+        <p:grpSpPr>
+          <a:xfrm>
+            <a:off x="13162039" y="5975185"/>
+            <a:ext cx="2177143" cy="1171959"/>
+            <a:chOff x="5943600" y="1293656"/>
+            <a:chExt cx="2177143" cy="1171959"/>
+          </a:xfrm>
+        </p:grpSpPr>
+        <p:cxnSp>
+          <p:nvCxnSpPr>
+            <p:cNvPr id="39" name="Straight Arrow Connector 38">
+              <a:extLst>
+                <a:ext uri="{FF2B5EF4-FFF2-40B4-BE49-F238E27FC236}">
+                  <a16:creationId xmlns:a16="http://schemas.microsoft.com/office/drawing/2014/main" id="{D5B47FFB-4E84-4756-BD08-D44B724DFB46}"/>
+                </a:ext>
+              </a:extLst>
+            </p:cNvPr>
+            <p:cNvCxnSpPr/>
+            <p:nvPr/>
+          </p:nvCxnSpPr>
+          <p:spPr>
+            <a:xfrm flipV="1">
+              <a:off x="5943600" y="2465612"/>
+              <a:ext cx="2177143" cy="3"/>
+            </a:xfrm>
+            <a:prstGeom prst="straightConnector1">
+              <a:avLst/>
+            </a:prstGeom>
+            <a:ln w="254000">
+              <a:tailEnd type="triangle"/>
+            </a:ln>
+          </p:spPr>
+          <p:style>
+            <a:lnRef idx="1">
+              <a:schemeClr val="accent1"/>
+            </a:lnRef>
+            <a:fillRef idx="0">
+              <a:schemeClr val="accent1"/>
+            </a:fillRef>
+            <a:effectRef idx="0">
+              <a:schemeClr val="accent1"/>
+            </a:effectRef>
+            <a:fontRef idx="minor">
+              <a:schemeClr val="tx1"/>
+            </a:fontRef>
+          </p:style>
+        </p:cxnSp>
+        <mc:AlternateContent xmlns:mc="http://schemas.openxmlformats.org/markup-compatibility/2006">
+          <mc:Choice xmlns:a14="http://schemas.microsoft.com/office/drawing/2010/main" Requires="a14">
+            <p:sp>
+              <p:nvSpPr>
+                <p:cNvPr id="40" name="TextBox 39">
+                  <a:extLst>
+                    <a:ext uri="{FF2B5EF4-FFF2-40B4-BE49-F238E27FC236}">
+                      <a16:creationId xmlns:a16="http://schemas.microsoft.com/office/drawing/2014/main" id="{45E201C0-93D9-4836-8D76-0067737D649C}"/>
+                    </a:ext>
+                  </a:extLst>
+                </p:cNvPr>
+                <p:cNvSpPr txBox="1"/>
+                <p:nvPr/>
+              </p:nvSpPr>
+              <p:spPr>
+                <a:xfrm>
+                  <a:off x="6276873" y="1293656"/>
+                  <a:ext cx="1075166" cy="923330"/>
+                </a:xfrm>
+                <a:prstGeom prst="rect">
+                  <a:avLst/>
+                </a:prstGeom>
+                <a:noFill/>
+              </p:spPr>
+              <p:txBody>
+                <a:bodyPr wrap="none" rtlCol="0">
+                  <a:spAutoFit/>
+                </a:bodyPr>
+                <a:lstStyle/>
+                <a:p>
+                  <a14:m>
+                    <m:oMathPara xmlns:m="http://schemas.openxmlformats.org/officeDocument/2006/math">
+                      <m:oMathParaPr>
+                        <m:jc m:val="centerGroup"/>
+                      </m:oMathParaPr>
+                      <m:oMath xmlns:m="http://schemas.openxmlformats.org/officeDocument/2006/math">
+                        <m:sSub>
+                          <m:sSubPr>
+                            <m:ctrlPr>
+                              <a:rPr lang="en-US" sz="5400" b="0" i="1" smtClean="0">
+                                <a:latin typeface="Cambria Math" panose="02040503050406030204" pitchFamily="18" charset="0"/>
+                              </a:rPr>
+                            </m:ctrlPr>
+                          </m:sSubPr>
+                          <m:e>
+                            <m:r>
+                              <a:rPr lang="en-US" sz="5400" b="0" i="1" smtClean="0">
+                                <a:latin typeface="Cambria Math" panose="02040503050406030204" pitchFamily="18" charset="0"/>
+                              </a:rPr>
+                              <m:t>𝑅</m:t>
+                            </m:r>
+                          </m:e>
+                          <m:sub>
+                            <m:r>
+                              <a:rPr lang="en-US" sz="5400" b="0" i="1" smtClean="0">
+                                <a:latin typeface="Cambria Math" panose="02040503050406030204" pitchFamily="18" charset="0"/>
+                              </a:rPr>
+                              <m:t>1</m:t>
+                            </m:r>
+                          </m:sub>
+                        </m:sSub>
+                      </m:oMath>
+                    </m:oMathPara>
+                  </a14:m>
+                  <a:endParaRPr lang="en-US" sz="5400" b="0" dirty="0"/>
+                </a:p>
+              </p:txBody>
+            </p:sp>
+          </mc:Choice>
+          <mc:Fallback>
+            <p:sp>
+              <p:nvSpPr>
+                <p:cNvPr id="40" name="TextBox 39">
+                  <a:extLst>
+                    <a:ext uri="{FF2B5EF4-FFF2-40B4-BE49-F238E27FC236}">
+                      <a16:creationId xmlns:a16="http://schemas.microsoft.com/office/drawing/2014/main" id="{45E201C0-93D9-4836-8D76-0067737D649C}"/>
+                    </a:ext>
+                  </a:extLst>
+                </p:cNvPr>
+                <p:cNvSpPr txBox="1">
+                  <a:spLocks noRot="1" noChangeAspect="1" noMove="1" noResize="1" noEditPoints="1" noAdjustHandles="1" noChangeArrowheads="1" noChangeShapeType="1" noTextEdit="1"/>
+                </p:cNvSpPr>
+                <p:nvPr/>
+              </p:nvSpPr>
+              <p:spPr>
+                <a:xfrm>
+                  <a:off x="6276873" y="1293656"/>
+                  <a:ext cx="1075166" cy="923330"/>
+                </a:xfrm>
+                <a:prstGeom prst="rect">
+                  <a:avLst/>
+                </a:prstGeom>
+                <a:blipFill>
+                  <a:blip r:embed="rId7"/>
+                  <a:stretch>
+                    <a:fillRect/>
+                  </a:stretch>
+                </a:blipFill>
+              </p:spPr>
+              <p:txBody>
+                <a:bodyPr/>
+                <a:lstStyle/>
+                <a:p>
+                  <a:r>
+                    <a:rPr lang="en-US">
+                      <a:noFill/>
+                    </a:rPr>
+                    <a:t> </a:t>
+                  </a:r>
+                </a:p>
+              </p:txBody>
+            </p:sp>
+          </mc:Fallback>
+        </mc:AlternateContent>
+      </p:grpSp>
+      <p:grpSp>
+        <p:nvGrpSpPr>
+          <p:cNvPr id="41" name="Group 40">
+            <a:extLst>
+              <a:ext uri="{FF2B5EF4-FFF2-40B4-BE49-F238E27FC236}">
+                <a16:creationId xmlns:a16="http://schemas.microsoft.com/office/drawing/2014/main" id="{98C40A79-6C65-4C31-9FE7-E7E1C5CD9D88}"/>
+              </a:ext>
+            </a:extLst>
+          </p:cNvPr>
+          <p:cNvGrpSpPr/>
+          <p:nvPr/>
+        </p:nvGrpSpPr>
+        <p:grpSpPr>
+          <a:xfrm>
+            <a:off x="27660600" y="6009019"/>
+            <a:ext cx="2177143" cy="1171959"/>
+            <a:chOff x="5943600" y="1293656"/>
+            <a:chExt cx="2177143" cy="1171959"/>
+          </a:xfrm>
+        </p:grpSpPr>
+        <p:cxnSp>
+          <p:nvCxnSpPr>
+            <p:cNvPr id="42" name="Straight Arrow Connector 41">
+              <a:extLst>
+                <a:ext uri="{FF2B5EF4-FFF2-40B4-BE49-F238E27FC236}">
+                  <a16:creationId xmlns:a16="http://schemas.microsoft.com/office/drawing/2014/main" id="{8E294A82-0FE9-4B4D-8D38-DC87A2D123B3}"/>
+                </a:ext>
+              </a:extLst>
+            </p:cNvPr>
+            <p:cNvCxnSpPr/>
+            <p:nvPr/>
+          </p:nvCxnSpPr>
+          <p:spPr>
+            <a:xfrm flipV="1">
+              <a:off x="5943600" y="2465612"/>
+              <a:ext cx="2177143" cy="3"/>
+            </a:xfrm>
+            <a:prstGeom prst="straightConnector1">
+              <a:avLst/>
+            </a:prstGeom>
+            <a:ln w="254000">
+              <a:tailEnd type="triangle"/>
+            </a:ln>
+          </p:spPr>
+          <p:style>
+            <a:lnRef idx="1">
+              <a:schemeClr val="accent1"/>
+            </a:lnRef>
+            <a:fillRef idx="0">
+              <a:schemeClr val="accent1"/>
+            </a:fillRef>
+            <a:effectRef idx="0">
+              <a:schemeClr val="accent1"/>
+            </a:effectRef>
+            <a:fontRef idx="minor">
+              <a:schemeClr val="tx1"/>
+            </a:fontRef>
+          </p:style>
+        </p:cxnSp>
+        <mc:AlternateContent xmlns:mc="http://schemas.openxmlformats.org/markup-compatibility/2006">
+          <mc:Choice xmlns:a14="http://schemas.microsoft.com/office/drawing/2010/main" Requires="a14">
+            <p:sp>
+              <p:nvSpPr>
+                <p:cNvPr id="43" name="TextBox 42">
+                  <a:extLst>
+                    <a:ext uri="{FF2B5EF4-FFF2-40B4-BE49-F238E27FC236}">
+                      <a16:creationId xmlns:a16="http://schemas.microsoft.com/office/drawing/2014/main" id="{33BDC22A-BFAB-446B-8969-AD08184C3C2F}"/>
+                    </a:ext>
+                  </a:extLst>
+                </p:cNvPr>
+                <p:cNvSpPr txBox="1"/>
+                <p:nvPr/>
+              </p:nvSpPr>
+              <p:spPr>
+                <a:xfrm>
+                  <a:off x="6276873" y="1293656"/>
+                  <a:ext cx="1091196" cy="923330"/>
+                </a:xfrm>
+                <a:prstGeom prst="rect">
+                  <a:avLst/>
+                </a:prstGeom>
+                <a:noFill/>
+              </p:spPr>
+              <p:txBody>
+                <a:bodyPr wrap="none" rtlCol="0">
+                  <a:spAutoFit/>
+                </a:bodyPr>
+                <a:lstStyle/>
+                <a:p>
+                  <a14:m>
+                    <m:oMathPara xmlns:m="http://schemas.openxmlformats.org/officeDocument/2006/math">
+                      <m:oMathParaPr>
+                        <m:jc m:val="centerGroup"/>
+                      </m:oMathParaPr>
+                      <m:oMath xmlns:m="http://schemas.openxmlformats.org/officeDocument/2006/math">
+                        <m:sSub>
+                          <m:sSubPr>
+                            <m:ctrlPr>
+                              <a:rPr lang="en-US" sz="5400" b="0" i="1" smtClean="0">
+                                <a:latin typeface="Cambria Math" panose="02040503050406030204" pitchFamily="18" charset="0"/>
+                              </a:rPr>
+                            </m:ctrlPr>
+                          </m:sSubPr>
+                          <m:e>
+                            <m:r>
+                              <a:rPr lang="en-US" sz="5400" b="0" i="1" smtClean="0">
+                                <a:latin typeface="Cambria Math" panose="02040503050406030204" pitchFamily="18" charset="0"/>
+                              </a:rPr>
+                              <m:t>𝑅</m:t>
+                            </m:r>
+                          </m:e>
+                          <m:sub>
+                            <m:r>
+                              <a:rPr lang="en-US" sz="5400" b="0" i="1" smtClean="0">
+                                <a:latin typeface="Cambria Math" panose="02040503050406030204" pitchFamily="18" charset="0"/>
+                              </a:rPr>
+                              <m:t>2</m:t>
+                            </m:r>
+                          </m:sub>
+                        </m:sSub>
+                      </m:oMath>
+                    </m:oMathPara>
+                  </a14:m>
+                  <a:endParaRPr lang="en-US" sz="5400" b="0" dirty="0"/>
+                </a:p>
+              </p:txBody>
+            </p:sp>
+          </mc:Choice>
+          <mc:Fallback>
+            <p:sp>
+              <p:nvSpPr>
+                <p:cNvPr id="43" name="TextBox 42">
+                  <a:extLst>
+                    <a:ext uri="{FF2B5EF4-FFF2-40B4-BE49-F238E27FC236}">
+                      <a16:creationId xmlns:a16="http://schemas.microsoft.com/office/drawing/2014/main" id="{33BDC22A-BFAB-446B-8969-AD08184C3C2F}"/>
+                    </a:ext>
+                  </a:extLst>
+                </p:cNvPr>
+                <p:cNvSpPr txBox="1">
+                  <a:spLocks noRot="1" noChangeAspect="1" noMove="1" noResize="1" noEditPoints="1" noAdjustHandles="1" noChangeArrowheads="1" noChangeShapeType="1" noTextEdit="1"/>
+                </p:cNvSpPr>
+                <p:nvPr/>
+              </p:nvSpPr>
+              <p:spPr>
+                <a:xfrm>
+                  <a:off x="6276873" y="1293656"/>
+                  <a:ext cx="1091196" cy="923330"/>
+                </a:xfrm>
+                <a:prstGeom prst="rect">
+                  <a:avLst/>
+                </a:prstGeom>
+                <a:blipFill>
+                  <a:blip r:embed="rId8"/>
+                  <a:stretch>
+                    <a:fillRect/>
+                  </a:stretch>
+                </a:blipFill>
+              </p:spPr>
+              <p:txBody>
+                <a:bodyPr/>
+                <a:lstStyle/>
+                <a:p>
+                  <a:r>
+                    <a:rPr lang="en-US">
+                      <a:noFill/>
+                    </a:rPr>
+                    <a:t> </a:t>
+                  </a:r>
+                </a:p>
+              </p:txBody>
+            </p:sp>
+          </mc:Fallback>
+        </mc:AlternateContent>
+      </p:grpSp>
+      <p:grpSp>
+        <p:nvGrpSpPr>
+          <p:cNvPr id="44" name="Group 43">
+            <a:extLst>
+              <a:ext uri="{FF2B5EF4-FFF2-40B4-BE49-F238E27FC236}">
+                <a16:creationId xmlns:a16="http://schemas.microsoft.com/office/drawing/2014/main" id="{A4C1D728-86C3-4B2A-BE79-5FC27FDA5A58}"/>
+              </a:ext>
+            </a:extLst>
+          </p:cNvPr>
+          <p:cNvGrpSpPr/>
+          <p:nvPr/>
+        </p:nvGrpSpPr>
+        <p:grpSpPr>
+          <a:xfrm>
+            <a:off x="20445133" y="6041570"/>
+            <a:ext cx="2177143" cy="1171959"/>
+            <a:chOff x="5943600" y="1293656"/>
+            <a:chExt cx="2177143" cy="1171959"/>
+          </a:xfrm>
+        </p:grpSpPr>
+        <p:cxnSp>
+          <p:nvCxnSpPr>
+            <p:cNvPr id="45" name="Straight Arrow Connector 44">
+              <a:extLst>
+                <a:ext uri="{FF2B5EF4-FFF2-40B4-BE49-F238E27FC236}">
+                  <a16:creationId xmlns:a16="http://schemas.microsoft.com/office/drawing/2014/main" id="{76E8E987-3957-4D10-BE48-F8EE034B8655}"/>
+                </a:ext>
+              </a:extLst>
+            </p:cNvPr>
+            <p:cNvCxnSpPr/>
+            <p:nvPr/>
+          </p:nvCxnSpPr>
+          <p:spPr>
+            <a:xfrm flipV="1">
+              <a:off x="5943600" y="2465612"/>
+              <a:ext cx="2177143" cy="3"/>
+            </a:xfrm>
+            <a:prstGeom prst="straightConnector1">
+              <a:avLst/>
+            </a:prstGeom>
+            <a:ln w="254000">
+              <a:tailEnd type="triangle"/>
+            </a:ln>
+          </p:spPr>
+          <p:style>
+            <a:lnRef idx="1">
+              <a:schemeClr val="accent1"/>
+            </a:lnRef>
+            <a:fillRef idx="0">
+              <a:schemeClr val="accent1"/>
+            </a:fillRef>
+            <a:effectRef idx="0">
+              <a:schemeClr val="accent1"/>
+            </a:effectRef>
+            <a:fontRef idx="minor">
+              <a:schemeClr val="tx1"/>
+            </a:fontRef>
+          </p:style>
+        </p:cxnSp>
+        <mc:AlternateContent xmlns:mc="http://schemas.openxmlformats.org/markup-compatibility/2006">
+          <mc:Choice xmlns:a14="http://schemas.microsoft.com/office/drawing/2010/main" Requires="a14">
+            <p:sp>
+              <p:nvSpPr>
+                <p:cNvPr id="46" name="TextBox 45">
+                  <a:extLst>
+                    <a:ext uri="{FF2B5EF4-FFF2-40B4-BE49-F238E27FC236}">
+                      <a16:creationId xmlns:a16="http://schemas.microsoft.com/office/drawing/2014/main" id="{49845FF3-BFCC-401D-83F5-9B54DF4BD1A4}"/>
+                    </a:ext>
+                  </a:extLst>
+                </p:cNvPr>
+                <p:cNvSpPr txBox="1"/>
+                <p:nvPr/>
+              </p:nvSpPr>
+              <p:spPr>
+                <a:xfrm>
+                  <a:off x="6276873" y="1293656"/>
+                  <a:ext cx="866968" cy="923330"/>
+                </a:xfrm>
+                <a:prstGeom prst="rect">
+                  <a:avLst/>
+                </a:prstGeom>
+                <a:noFill/>
+              </p:spPr>
+              <p:txBody>
+                <a:bodyPr wrap="none" rtlCol="0">
+                  <a:spAutoFit/>
+                </a:bodyPr>
+                <a:lstStyle/>
+                <a:p>
+                  <a14:m>
+                    <m:oMathPara xmlns:m="http://schemas.openxmlformats.org/officeDocument/2006/math">
+                      <m:oMathParaPr>
+                        <m:jc m:val="centerGroup"/>
+                      </m:oMathParaPr>
+                      <m:oMath xmlns:m="http://schemas.openxmlformats.org/officeDocument/2006/math">
+                        <m:r>
+                          <a:rPr lang="en-US" sz="5400" b="0" i="1" smtClean="0">
+                            <a:latin typeface="Cambria Math" panose="02040503050406030204" pitchFamily="18" charset="0"/>
+                          </a:rPr>
+                          <m:t>𝐻</m:t>
+                        </m:r>
+                      </m:oMath>
+                    </m:oMathPara>
+                  </a14:m>
+                  <a:endParaRPr lang="en-US" sz="5400" b="0" dirty="0"/>
+                </a:p>
+              </p:txBody>
+            </p:sp>
+          </mc:Choice>
+          <mc:Fallback>
+            <p:sp>
+              <p:nvSpPr>
+                <p:cNvPr id="46" name="TextBox 45">
+                  <a:extLst>
+                    <a:ext uri="{FF2B5EF4-FFF2-40B4-BE49-F238E27FC236}">
+                      <a16:creationId xmlns:a16="http://schemas.microsoft.com/office/drawing/2014/main" id="{49845FF3-BFCC-401D-83F5-9B54DF4BD1A4}"/>
+                    </a:ext>
+                  </a:extLst>
+                </p:cNvPr>
+                <p:cNvSpPr txBox="1">
+                  <a:spLocks noRot="1" noChangeAspect="1" noMove="1" noResize="1" noEditPoints="1" noAdjustHandles="1" noChangeArrowheads="1" noChangeShapeType="1" noTextEdit="1"/>
+                </p:cNvSpPr>
+                <p:nvPr/>
+              </p:nvSpPr>
+              <p:spPr>
+                <a:xfrm>
+                  <a:off x="6276873" y="1293656"/>
+                  <a:ext cx="866968" cy="923330"/>
+                </a:xfrm>
+                <a:prstGeom prst="rect">
+                  <a:avLst/>
+                </a:prstGeom>
+                <a:blipFill>
+                  <a:blip r:embed="rId9"/>
+                  <a:stretch>
+                    <a:fillRect/>
+                  </a:stretch>
+                </a:blipFill>
+              </p:spPr>
+              <p:txBody>
+                <a:bodyPr/>
+                <a:lstStyle/>
+                <a:p>
+                  <a:r>
+                    <a:rPr lang="en-US">
+                      <a:noFill/>
+                    </a:rPr>
+                    <a:t> </a:t>
+                  </a:r>
+                </a:p>
+              </p:txBody>
+            </p:sp>
+          </mc:Fallback>
+        </mc:AlternateContent>
+      </p:grpSp>
+      <p:sp>
+        <p:nvSpPr>
+          <p:cNvPr id="47" name="Rectangle: Rounded Corners 46">
+            <a:extLst>
+              <a:ext uri="{FF2B5EF4-FFF2-40B4-BE49-F238E27FC236}">
+                <a16:creationId xmlns:a16="http://schemas.microsoft.com/office/drawing/2014/main" id="{12D8A143-67ED-4368-A54C-288F556A2C3E}"/>
+              </a:ext>
+            </a:extLst>
+          </p:cNvPr>
+          <p:cNvSpPr/>
+          <p:nvPr/>
+        </p:nvSpPr>
+        <p:spPr>
+          <a:xfrm>
+            <a:off x="881743" y="10677139"/>
+            <a:ext cx="5061857" cy="2841171"/>
+          </a:xfrm>
+          <a:prstGeom prst="roundRect">
+            <a:avLst/>
+          </a:prstGeom>
+        </p:spPr>
+        <p:style>
+          <a:lnRef idx="2">
+            <a:schemeClr val="accent3">
+              <a:shade val="50000"/>
+            </a:schemeClr>
+          </a:lnRef>
+          <a:fillRef idx="1">
+            <a:schemeClr val="accent3"/>
+          </a:fillRef>
+          <a:effectRef idx="0">
+            <a:schemeClr val="accent3"/>
+          </a:effectRef>
+          <a:fontRef idx="minor">
+            <a:schemeClr val="lt1"/>
+          </a:fontRef>
+        </p:style>
+        <p:txBody>
+          <a:bodyPr rtlCol="0" anchor="ctr"/>
+          <a:lstStyle/>
+          <a:p>
+            <a:pPr algn="ctr"/>
+            <a:r>
+              <a:rPr lang="en-US" sz="6600" dirty="0"/>
+              <a:t>more</a:t>
+            </a:r>
+          </a:p>
+        </p:txBody>
+      </p:sp>
+      <p:sp>
+        <p:nvSpPr>
+          <p:cNvPr id="48" name="Rectangle: Rounded Corners 47">
+            <a:extLst>
+              <a:ext uri="{FF2B5EF4-FFF2-40B4-BE49-F238E27FC236}">
+                <a16:creationId xmlns:a16="http://schemas.microsoft.com/office/drawing/2014/main" id="{633EF6DA-6717-440D-B5D8-5AADC10D9F6F}"/>
+              </a:ext>
+            </a:extLst>
+          </p:cNvPr>
+          <p:cNvSpPr/>
+          <p:nvPr/>
+        </p:nvSpPr>
+        <p:spPr>
+          <a:xfrm>
+            <a:off x="8120743" y="10677139"/>
+            <a:ext cx="5061857" cy="2841171"/>
+          </a:xfrm>
+          <a:prstGeom prst="roundRect">
+            <a:avLst/>
+          </a:prstGeom>
+        </p:spPr>
+        <p:style>
+          <a:lnRef idx="1">
+            <a:schemeClr val="accent3"/>
+          </a:lnRef>
+          <a:fillRef idx="2">
+            <a:schemeClr val="accent3"/>
+          </a:fillRef>
+          <a:effectRef idx="1">
+            <a:schemeClr val="accent3"/>
+          </a:effectRef>
+          <a:fontRef idx="minor">
+            <a:schemeClr val="dk1"/>
+          </a:fontRef>
+        </p:style>
+        <p:txBody>
+          <a:bodyPr rtlCol="0" anchor="ctr"/>
+          <a:lstStyle/>
+          <a:p>
+            <a:pPr algn="ctr"/>
+            <a:r>
+              <a:rPr lang="en-US" sz="6600" dirty="0"/>
+              <a:t>78a109</a:t>
+            </a:r>
+          </a:p>
+        </p:txBody>
+      </p:sp>
+      <p:sp>
+        <p:nvSpPr>
+          <p:cNvPr id="49" name="Rectangle: Rounded Corners 48">
+            <a:extLst>
+              <a:ext uri="{FF2B5EF4-FFF2-40B4-BE49-F238E27FC236}">
+                <a16:creationId xmlns:a16="http://schemas.microsoft.com/office/drawing/2014/main" id="{604248EF-B435-4B38-BA31-732309BF8F92}"/>
+              </a:ext>
+            </a:extLst>
+          </p:cNvPr>
+          <p:cNvSpPr/>
+          <p:nvPr/>
+        </p:nvSpPr>
+        <p:spPr>
+          <a:xfrm>
+            <a:off x="22598743" y="10677138"/>
+            <a:ext cx="5061857" cy="2841171"/>
+          </a:xfrm>
+          <a:prstGeom prst="roundRect">
+            <a:avLst/>
+          </a:prstGeom>
+        </p:spPr>
+        <p:style>
+          <a:lnRef idx="1">
+            <a:schemeClr val="accent3"/>
+          </a:lnRef>
+          <a:fillRef idx="2">
+            <a:schemeClr val="accent3"/>
+          </a:fillRef>
+          <a:effectRef idx="1">
+            <a:schemeClr val="accent3"/>
+          </a:effectRef>
+          <a:fontRef idx="minor">
+            <a:schemeClr val="dk1"/>
+          </a:fontRef>
+        </p:style>
+        <p:txBody>
+          <a:bodyPr rtlCol="0" anchor="ctr"/>
+          <a:lstStyle/>
+          <a:p>
+            <a:pPr algn="ctr"/>
+            <a:r>
+              <a:rPr lang="en-US" sz="6600" dirty="0"/>
+              <a:t>91a921</a:t>
+            </a:r>
+          </a:p>
+        </p:txBody>
+      </p:sp>
+      <p:sp>
+        <p:nvSpPr>
+          <p:cNvPr id="50" name="Rectangle: Rounded Corners 49">
+            <a:extLst>
+              <a:ext uri="{FF2B5EF4-FFF2-40B4-BE49-F238E27FC236}">
+                <a16:creationId xmlns:a16="http://schemas.microsoft.com/office/drawing/2014/main" id="{0493FA37-1BD1-4552-B3B2-7608128976BC}"/>
+              </a:ext>
+            </a:extLst>
+          </p:cNvPr>
+          <p:cNvSpPr/>
+          <p:nvPr/>
+        </p:nvSpPr>
+        <p:spPr>
+          <a:xfrm>
+            <a:off x="15359743" y="10677139"/>
+            <a:ext cx="5061857" cy="2841171"/>
+          </a:xfrm>
+          <a:prstGeom prst="roundRect">
+            <a:avLst/>
+          </a:prstGeom>
+        </p:spPr>
+        <p:style>
+          <a:lnRef idx="2">
+            <a:schemeClr val="accent3">
+              <a:shade val="50000"/>
+            </a:schemeClr>
+          </a:lnRef>
+          <a:fillRef idx="1">
+            <a:schemeClr val="accent3"/>
+          </a:fillRef>
+          <a:effectRef idx="0">
+            <a:schemeClr val="accent3"/>
+          </a:effectRef>
+          <a:fontRef idx="minor">
+            <a:schemeClr val="lt1"/>
+          </a:fontRef>
+        </p:style>
+        <p:txBody>
+          <a:bodyPr rtlCol="0" anchor="ctr"/>
+          <a:lstStyle/>
+          <a:p>
+            <a:pPr algn="ctr"/>
+            <a:r>
+              <a:rPr lang="en-US" sz="6600" dirty="0" err="1"/>
+              <a:t>hahaha</a:t>
+            </a:r>
+            <a:endParaRPr lang="en-US" sz="6600" dirty="0"/>
+          </a:p>
+        </p:txBody>
+      </p:sp>
+      <p:sp>
+        <p:nvSpPr>
+          <p:cNvPr id="51" name="Rectangle: Rounded Corners 50">
+            <a:extLst>
+              <a:ext uri="{FF2B5EF4-FFF2-40B4-BE49-F238E27FC236}">
+                <a16:creationId xmlns:a16="http://schemas.microsoft.com/office/drawing/2014/main" id="{F423C6A8-9824-4E45-B63C-D13C88D157C0}"/>
+              </a:ext>
+            </a:extLst>
+          </p:cNvPr>
+          <p:cNvSpPr/>
+          <p:nvPr/>
+        </p:nvSpPr>
+        <p:spPr>
+          <a:xfrm>
+            <a:off x="29837743" y="10677137"/>
+            <a:ext cx="5061857" cy="2841171"/>
+          </a:xfrm>
+          <a:prstGeom prst="roundRect">
+            <a:avLst/>
+          </a:prstGeom>
+        </p:spPr>
+        <p:style>
+          <a:lnRef idx="2">
+            <a:schemeClr val="accent3">
+              <a:shade val="50000"/>
+            </a:schemeClr>
+          </a:lnRef>
+          <a:fillRef idx="1">
+            <a:schemeClr val="accent3"/>
+          </a:fillRef>
+          <a:effectRef idx="0">
+            <a:schemeClr val="accent3"/>
+          </a:effectRef>
+          <a:fontRef idx="minor">
+            <a:schemeClr val="lt1"/>
+          </a:fontRef>
+        </p:style>
+        <p:txBody>
+          <a:bodyPr rtlCol="0" anchor="ctr"/>
+          <a:lstStyle/>
+          <a:p>
+            <a:pPr algn="ctr"/>
+            <a:r>
+              <a:rPr lang="en-US" sz="6600" dirty="0"/>
+              <a:t>good</a:t>
+            </a:r>
+          </a:p>
+        </p:txBody>
+      </p:sp>
+      <p:grpSp>
+        <p:nvGrpSpPr>
+          <p:cNvPr id="52" name="Group 51">
+            <a:extLst>
+              <a:ext uri="{FF2B5EF4-FFF2-40B4-BE49-F238E27FC236}">
+                <a16:creationId xmlns:a16="http://schemas.microsoft.com/office/drawing/2014/main" id="{B35EF8BC-7A04-4142-BDEE-338D6FCD4417}"/>
+              </a:ext>
+            </a:extLst>
+          </p:cNvPr>
+          <p:cNvGrpSpPr/>
+          <p:nvPr/>
+        </p:nvGrpSpPr>
+        <p:grpSpPr>
+          <a:xfrm>
+            <a:off x="5964161" y="11067952"/>
+            <a:ext cx="2177143" cy="1019556"/>
+            <a:chOff x="5791200" y="1293656"/>
+            <a:chExt cx="2177143" cy="10651664"/>
+          </a:xfrm>
+        </p:grpSpPr>
+        <p:cxnSp>
+          <p:nvCxnSpPr>
+            <p:cNvPr id="53" name="Straight Arrow Connector 52">
+              <a:extLst>
+                <a:ext uri="{FF2B5EF4-FFF2-40B4-BE49-F238E27FC236}">
+                  <a16:creationId xmlns:a16="http://schemas.microsoft.com/office/drawing/2014/main" id="{035205B6-A712-486D-8784-C7B6EA084F6D}"/>
+                </a:ext>
+              </a:extLst>
+            </p:cNvPr>
+            <p:cNvCxnSpPr>
+              <a:cxnSpLocks/>
+              <a:stCxn id="47" idx="3"/>
+            </p:cNvCxnSpPr>
+            <p:nvPr/>
+          </p:nvCxnSpPr>
+          <p:spPr>
+            <a:xfrm flipV="1">
+              <a:off x="5791200" y="11945320"/>
+              <a:ext cx="2177143" cy="0"/>
+            </a:xfrm>
+            <a:prstGeom prst="straightConnector1">
+              <a:avLst/>
+            </a:prstGeom>
+            <a:ln w="254000">
+              <a:tailEnd type="triangle"/>
+            </a:ln>
+          </p:spPr>
+          <p:style>
+            <a:lnRef idx="1">
+              <a:schemeClr val="accent1"/>
+            </a:lnRef>
+            <a:fillRef idx="0">
+              <a:schemeClr val="accent1"/>
+            </a:fillRef>
+            <a:effectRef idx="0">
+              <a:schemeClr val="accent1"/>
+            </a:effectRef>
+            <a:fontRef idx="minor">
+              <a:schemeClr val="tx1"/>
+            </a:fontRef>
+          </p:style>
+        </p:cxnSp>
+        <mc:AlternateContent xmlns:mc="http://schemas.openxmlformats.org/markup-compatibility/2006">
+          <mc:Choice xmlns:a14="http://schemas.microsoft.com/office/drawing/2010/main" Requires="a14">
+            <p:sp>
+              <p:nvSpPr>
+                <p:cNvPr id="54" name="TextBox 53">
+                  <a:extLst>
+                    <a:ext uri="{FF2B5EF4-FFF2-40B4-BE49-F238E27FC236}">
+                      <a16:creationId xmlns:a16="http://schemas.microsoft.com/office/drawing/2014/main" id="{0668836A-FA3E-4945-A03B-3469F37F5ECF}"/>
+                    </a:ext>
+                  </a:extLst>
+                </p:cNvPr>
+                <p:cNvSpPr txBox="1"/>
+                <p:nvPr/>
+              </p:nvSpPr>
+              <p:spPr>
+                <a:xfrm>
+                  <a:off x="6276873" y="1293656"/>
+                  <a:ext cx="866968" cy="923327"/>
+                </a:xfrm>
+                <a:prstGeom prst="rect">
+                  <a:avLst/>
+                </a:prstGeom>
+                <a:noFill/>
+              </p:spPr>
+              <p:txBody>
+                <a:bodyPr wrap="none" rtlCol="0">
+                  <a:spAutoFit/>
+                </a:bodyPr>
+                <a:lstStyle/>
+                <a:p>
+                  <a14:m>
+                    <m:oMathPara xmlns:m="http://schemas.openxmlformats.org/officeDocument/2006/math">
+                      <m:oMathParaPr>
+                        <m:jc m:val="centerGroup"/>
+                      </m:oMathParaPr>
+                      <m:oMath xmlns:m="http://schemas.openxmlformats.org/officeDocument/2006/math">
+                        <m:r>
+                          <a:rPr lang="en-US" sz="5400" b="0" i="1" smtClean="0">
+                            <a:latin typeface="Cambria Math" panose="02040503050406030204" pitchFamily="18" charset="0"/>
+                          </a:rPr>
+                          <m:t>𝐻</m:t>
+                        </m:r>
+                      </m:oMath>
+                    </m:oMathPara>
+                  </a14:m>
+                  <a:endParaRPr lang="en-US" sz="5400" b="0" dirty="0"/>
+                </a:p>
+              </p:txBody>
+            </p:sp>
+          </mc:Choice>
+          <mc:Fallback>
+            <p:sp>
+              <p:nvSpPr>
+                <p:cNvPr id="54" name="TextBox 53">
+                  <a:extLst>
+                    <a:ext uri="{FF2B5EF4-FFF2-40B4-BE49-F238E27FC236}">
+                      <a16:creationId xmlns:a16="http://schemas.microsoft.com/office/drawing/2014/main" id="{0668836A-FA3E-4945-A03B-3469F37F5ECF}"/>
+                    </a:ext>
+                  </a:extLst>
+                </p:cNvPr>
+                <p:cNvSpPr txBox="1">
+                  <a:spLocks noRot="1" noChangeAspect="1" noMove="1" noResize="1" noEditPoints="1" noAdjustHandles="1" noChangeArrowheads="1" noChangeShapeType="1" noTextEdit="1"/>
+                </p:cNvSpPr>
+                <p:nvPr/>
+              </p:nvSpPr>
+              <p:spPr>
+                <a:xfrm>
+                  <a:off x="6276873" y="1293656"/>
+                  <a:ext cx="866968" cy="923327"/>
+                </a:xfrm>
+                <a:prstGeom prst="rect">
+                  <a:avLst/>
+                </a:prstGeom>
+                <a:blipFill>
+                  <a:blip r:embed="rId10"/>
+                  <a:stretch>
+                    <a:fillRect b="-707143"/>
+                  </a:stretch>
+                </a:blipFill>
+              </p:spPr>
+              <p:txBody>
+                <a:bodyPr/>
+                <a:lstStyle/>
+                <a:p>
+                  <a:r>
+                    <a:rPr lang="en-US">
+                      <a:noFill/>
+                    </a:rPr>
+                    <a:t> </a:t>
+                  </a:r>
+                </a:p>
+              </p:txBody>
+            </p:sp>
+          </mc:Fallback>
+        </mc:AlternateContent>
+      </p:grpSp>
+      <p:grpSp>
+        <p:nvGrpSpPr>
+          <p:cNvPr id="55" name="Group 54">
+            <a:extLst>
+              <a:ext uri="{FF2B5EF4-FFF2-40B4-BE49-F238E27FC236}">
+                <a16:creationId xmlns:a16="http://schemas.microsoft.com/office/drawing/2014/main" id="{8003F7F1-0B54-4E96-AEE1-F535DB60FFD6}"/>
+              </a:ext>
+            </a:extLst>
+          </p:cNvPr>
+          <p:cNvGrpSpPr/>
+          <p:nvPr/>
+        </p:nvGrpSpPr>
+        <p:grpSpPr>
+          <a:xfrm>
+            <a:off x="13162039" y="10915552"/>
+            <a:ext cx="2177143" cy="1171959"/>
+            <a:chOff x="5943600" y="1293656"/>
+            <a:chExt cx="2177143" cy="1171959"/>
+          </a:xfrm>
+        </p:grpSpPr>
+        <p:cxnSp>
+          <p:nvCxnSpPr>
+            <p:cNvPr id="56" name="Straight Arrow Connector 55">
+              <a:extLst>
+                <a:ext uri="{FF2B5EF4-FFF2-40B4-BE49-F238E27FC236}">
+                  <a16:creationId xmlns:a16="http://schemas.microsoft.com/office/drawing/2014/main" id="{76046697-B07C-4259-9105-4C5DF0E77CCC}"/>
+                </a:ext>
+              </a:extLst>
+            </p:cNvPr>
+            <p:cNvCxnSpPr/>
+            <p:nvPr/>
+          </p:nvCxnSpPr>
+          <p:spPr>
+            <a:xfrm flipV="1">
+              <a:off x="5943600" y="2465612"/>
+              <a:ext cx="2177143" cy="3"/>
+            </a:xfrm>
+            <a:prstGeom prst="straightConnector1">
+              <a:avLst/>
+            </a:prstGeom>
+            <a:ln w="254000">
+              <a:tailEnd type="triangle"/>
+            </a:ln>
+          </p:spPr>
+          <p:style>
+            <a:lnRef idx="1">
+              <a:schemeClr val="accent1"/>
+            </a:lnRef>
+            <a:fillRef idx="0">
+              <a:schemeClr val="accent1"/>
+            </a:fillRef>
+            <a:effectRef idx="0">
+              <a:schemeClr val="accent1"/>
+            </a:effectRef>
+            <a:fontRef idx="minor">
+              <a:schemeClr val="tx1"/>
+            </a:fontRef>
+          </p:style>
+        </p:cxnSp>
+        <mc:AlternateContent xmlns:mc="http://schemas.openxmlformats.org/markup-compatibility/2006">
+          <mc:Choice xmlns:a14="http://schemas.microsoft.com/office/drawing/2010/main" Requires="a14">
+            <p:sp>
+              <p:nvSpPr>
+                <p:cNvPr id="57" name="TextBox 56">
+                  <a:extLst>
+                    <a:ext uri="{FF2B5EF4-FFF2-40B4-BE49-F238E27FC236}">
+                      <a16:creationId xmlns:a16="http://schemas.microsoft.com/office/drawing/2014/main" id="{EA92B65C-75F6-4A89-A4EF-4C69B6E1FF7B}"/>
+                    </a:ext>
+                  </a:extLst>
+                </p:cNvPr>
+                <p:cNvSpPr txBox="1"/>
+                <p:nvPr/>
+              </p:nvSpPr>
+              <p:spPr>
+                <a:xfrm>
+                  <a:off x="6276873" y="1293656"/>
+                  <a:ext cx="1075166" cy="923330"/>
+                </a:xfrm>
+                <a:prstGeom prst="rect">
+                  <a:avLst/>
+                </a:prstGeom>
+                <a:noFill/>
+              </p:spPr>
+              <p:txBody>
+                <a:bodyPr wrap="none" rtlCol="0">
+                  <a:spAutoFit/>
+                </a:bodyPr>
+                <a:lstStyle/>
+                <a:p>
+                  <a14:m>
+                    <m:oMathPara xmlns:m="http://schemas.openxmlformats.org/officeDocument/2006/math">
+                      <m:oMathParaPr>
+                        <m:jc m:val="centerGroup"/>
+                      </m:oMathParaPr>
+                      <m:oMath xmlns:m="http://schemas.openxmlformats.org/officeDocument/2006/math">
+                        <m:sSub>
+                          <m:sSubPr>
+                            <m:ctrlPr>
+                              <a:rPr lang="en-US" sz="5400" b="0" i="1" smtClean="0">
+                                <a:latin typeface="Cambria Math" panose="02040503050406030204" pitchFamily="18" charset="0"/>
+                              </a:rPr>
+                            </m:ctrlPr>
+                          </m:sSubPr>
+                          <m:e>
+                            <m:r>
+                              <a:rPr lang="en-US" sz="5400" b="0" i="1" smtClean="0">
+                                <a:latin typeface="Cambria Math" panose="02040503050406030204" pitchFamily="18" charset="0"/>
+                              </a:rPr>
+                              <m:t>𝑅</m:t>
+                            </m:r>
+                          </m:e>
+                          <m:sub>
+                            <m:r>
+                              <a:rPr lang="en-US" sz="5400" b="0" i="1" smtClean="0">
+                                <a:latin typeface="Cambria Math" panose="02040503050406030204" pitchFamily="18" charset="0"/>
+                              </a:rPr>
+                              <m:t>1</m:t>
+                            </m:r>
+                          </m:sub>
+                        </m:sSub>
+                      </m:oMath>
+                    </m:oMathPara>
+                  </a14:m>
+                  <a:endParaRPr lang="en-US" sz="5400" b="0" dirty="0"/>
+                </a:p>
+              </p:txBody>
+            </p:sp>
+          </mc:Choice>
+          <mc:Fallback>
+            <p:sp>
+              <p:nvSpPr>
+                <p:cNvPr id="57" name="TextBox 56">
+                  <a:extLst>
+                    <a:ext uri="{FF2B5EF4-FFF2-40B4-BE49-F238E27FC236}">
+                      <a16:creationId xmlns:a16="http://schemas.microsoft.com/office/drawing/2014/main" id="{EA92B65C-75F6-4A89-A4EF-4C69B6E1FF7B}"/>
+                    </a:ext>
+                  </a:extLst>
+                </p:cNvPr>
+                <p:cNvSpPr txBox="1">
+                  <a:spLocks noRot="1" noChangeAspect="1" noMove="1" noResize="1" noEditPoints="1" noAdjustHandles="1" noChangeArrowheads="1" noChangeShapeType="1" noTextEdit="1"/>
+                </p:cNvSpPr>
+                <p:nvPr/>
+              </p:nvSpPr>
+              <p:spPr>
+                <a:xfrm>
+                  <a:off x="6276873" y="1293656"/>
+                  <a:ext cx="1075166" cy="923330"/>
+                </a:xfrm>
+                <a:prstGeom prst="rect">
+                  <a:avLst/>
+                </a:prstGeom>
+                <a:blipFill>
+                  <a:blip r:embed="rId11"/>
+                  <a:stretch>
+                    <a:fillRect/>
+                  </a:stretch>
+                </a:blipFill>
+              </p:spPr>
+              <p:txBody>
+                <a:bodyPr/>
+                <a:lstStyle/>
+                <a:p>
+                  <a:r>
+                    <a:rPr lang="en-US">
+                      <a:noFill/>
+                    </a:rPr>
+                    <a:t> </a:t>
+                  </a:r>
+                </a:p>
+              </p:txBody>
+            </p:sp>
+          </mc:Fallback>
+        </mc:AlternateContent>
+      </p:grpSp>
+      <p:grpSp>
+        <p:nvGrpSpPr>
+          <p:cNvPr id="58" name="Group 57">
+            <a:extLst>
+              <a:ext uri="{FF2B5EF4-FFF2-40B4-BE49-F238E27FC236}">
+                <a16:creationId xmlns:a16="http://schemas.microsoft.com/office/drawing/2014/main" id="{B6C7EEAA-40D5-4422-99F2-61D0CCDD627D}"/>
+              </a:ext>
+            </a:extLst>
+          </p:cNvPr>
+          <p:cNvGrpSpPr/>
+          <p:nvPr/>
+        </p:nvGrpSpPr>
+        <p:grpSpPr>
+          <a:xfrm>
+            <a:off x="27660600" y="10949386"/>
+            <a:ext cx="2177143" cy="1171959"/>
+            <a:chOff x="5943600" y="1293656"/>
+            <a:chExt cx="2177143" cy="1171959"/>
+          </a:xfrm>
+        </p:grpSpPr>
+        <p:cxnSp>
+          <p:nvCxnSpPr>
+            <p:cNvPr id="59" name="Straight Arrow Connector 58">
+              <a:extLst>
+                <a:ext uri="{FF2B5EF4-FFF2-40B4-BE49-F238E27FC236}">
+                  <a16:creationId xmlns:a16="http://schemas.microsoft.com/office/drawing/2014/main" id="{DD79B7C9-ECD2-4DB5-AAC4-C3E5E926BE75}"/>
+                </a:ext>
+              </a:extLst>
+            </p:cNvPr>
+            <p:cNvCxnSpPr/>
+            <p:nvPr/>
+          </p:nvCxnSpPr>
+          <p:spPr>
+            <a:xfrm flipV="1">
+              <a:off x="5943600" y="2465612"/>
+              <a:ext cx="2177143" cy="3"/>
+            </a:xfrm>
+            <a:prstGeom prst="straightConnector1">
+              <a:avLst/>
+            </a:prstGeom>
+            <a:ln w="254000">
+              <a:tailEnd type="triangle"/>
+            </a:ln>
+          </p:spPr>
+          <p:style>
+            <a:lnRef idx="1">
+              <a:schemeClr val="accent1"/>
+            </a:lnRef>
+            <a:fillRef idx="0">
+              <a:schemeClr val="accent1"/>
+            </a:fillRef>
+            <a:effectRef idx="0">
+              <a:schemeClr val="accent1"/>
+            </a:effectRef>
+            <a:fontRef idx="minor">
+              <a:schemeClr val="tx1"/>
+            </a:fontRef>
+          </p:style>
+        </p:cxnSp>
+        <mc:AlternateContent xmlns:mc="http://schemas.openxmlformats.org/markup-compatibility/2006">
+          <mc:Choice xmlns:a14="http://schemas.microsoft.com/office/drawing/2010/main" Requires="a14">
+            <p:sp>
+              <p:nvSpPr>
+                <p:cNvPr id="60" name="TextBox 59">
+                  <a:extLst>
+                    <a:ext uri="{FF2B5EF4-FFF2-40B4-BE49-F238E27FC236}">
+                      <a16:creationId xmlns:a16="http://schemas.microsoft.com/office/drawing/2014/main" id="{ABED82CC-4FD0-4545-BF39-40DFEAD3ADDF}"/>
+                    </a:ext>
+                  </a:extLst>
+                </p:cNvPr>
+                <p:cNvSpPr txBox="1"/>
+                <p:nvPr/>
+              </p:nvSpPr>
+              <p:spPr>
+                <a:xfrm>
+                  <a:off x="6276873" y="1293656"/>
+                  <a:ext cx="1091196" cy="923330"/>
+                </a:xfrm>
+                <a:prstGeom prst="rect">
+                  <a:avLst/>
+                </a:prstGeom>
+                <a:noFill/>
+              </p:spPr>
+              <p:txBody>
+                <a:bodyPr wrap="none" rtlCol="0">
+                  <a:spAutoFit/>
+                </a:bodyPr>
+                <a:lstStyle/>
+                <a:p>
+                  <a14:m>
+                    <m:oMathPara xmlns:m="http://schemas.openxmlformats.org/officeDocument/2006/math">
+                      <m:oMathParaPr>
+                        <m:jc m:val="centerGroup"/>
+                      </m:oMathParaPr>
+                      <m:oMath xmlns:m="http://schemas.openxmlformats.org/officeDocument/2006/math">
+                        <m:sSub>
+                          <m:sSubPr>
+                            <m:ctrlPr>
+                              <a:rPr lang="en-US" sz="5400" b="0" i="1" smtClean="0">
+                                <a:latin typeface="Cambria Math" panose="02040503050406030204" pitchFamily="18" charset="0"/>
+                              </a:rPr>
+                            </m:ctrlPr>
+                          </m:sSubPr>
+                          <m:e>
+                            <m:r>
+                              <a:rPr lang="en-US" sz="5400" b="0" i="1" smtClean="0">
+                                <a:latin typeface="Cambria Math" panose="02040503050406030204" pitchFamily="18" charset="0"/>
+                              </a:rPr>
+                              <m:t>𝑅</m:t>
+                            </m:r>
+                          </m:e>
+                          <m:sub>
+                            <m:r>
+                              <a:rPr lang="en-US" sz="5400" b="0" i="1" smtClean="0">
+                                <a:latin typeface="Cambria Math" panose="02040503050406030204" pitchFamily="18" charset="0"/>
+                              </a:rPr>
+                              <m:t>2</m:t>
+                            </m:r>
+                          </m:sub>
+                        </m:sSub>
+                      </m:oMath>
+                    </m:oMathPara>
+                  </a14:m>
+                  <a:endParaRPr lang="en-US" sz="5400" b="0" dirty="0"/>
+                </a:p>
+              </p:txBody>
+            </p:sp>
+          </mc:Choice>
+          <mc:Fallback>
+            <p:sp>
+              <p:nvSpPr>
+                <p:cNvPr id="60" name="TextBox 59">
+                  <a:extLst>
+                    <a:ext uri="{FF2B5EF4-FFF2-40B4-BE49-F238E27FC236}">
+                      <a16:creationId xmlns:a16="http://schemas.microsoft.com/office/drawing/2014/main" id="{ABED82CC-4FD0-4545-BF39-40DFEAD3ADDF}"/>
+                    </a:ext>
+                  </a:extLst>
+                </p:cNvPr>
+                <p:cNvSpPr txBox="1">
+                  <a:spLocks noRot="1" noChangeAspect="1" noMove="1" noResize="1" noEditPoints="1" noAdjustHandles="1" noChangeArrowheads="1" noChangeShapeType="1" noTextEdit="1"/>
+                </p:cNvSpPr>
+                <p:nvPr/>
+              </p:nvSpPr>
+              <p:spPr>
+                <a:xfrm>
+                  <a:off x="6276873" y="1293656"/>
+                  <a:ext cx="1091196" cy="923330"/>
+                </a:xfrm>
+                <a:prstGeom prst="rect">
+                  <a:avLst/>
+                </a:prstGeom>
+                <a:blipFill>
+                  <a:blip r:embed="rId12"/>
+                  <a:stretch>
+                    <a:fillRect/>
+                  </a:stretch>
+                </a:blipFill>
+              </p:spPr>
+              <p:txBody>
+                <a:bodyPr/>
+                <a:lstStyle/>
+                <a:p>
+                  <a:r>
+                    <a:rPr lang="en-US">
+                      <a:noFill/>
+                    </a:rPr>
+                    <a:t> </a:t>
+                  </a:r>
+                </a:p>
+              </p:txBody>
+            </p:sp>
+          </mc:Fallback>
+        </mc:AlternateContent>
+      </p:grpSp>
+      <p:grpSp>
+        <p:nvGrpSpPr>
+          <p:cNvPr id="61" name="Group 60">
+            <a:extLst>
+              <a:ext uri="{FF2B5EF4-FFF2-40B4-BE49-F238E27FC236}">
+                <a16:creationId xmlns:a16="http://schemas.microsoft.com/office/drawing/2014/main" id="{D778357D-FDF6-4DBA-B583-FD40D5F4BFFC}"/>
+              </a:ext>
+            </a:extLst>
+          </p:cNvPr>
+          <p:cNvGrpSpPr/>
+          <p:nvPr/>
+        </p:nvGrpSpPr>
+        <p:grpSpPr>
+          <a:xfrm>
+            <a:off x="20445133" y="10981937"/>
+            <a:ext cx="2177143" cy="1171959"/>
+            <a:chOff x="5943600" y="1293656"/>
+            <a:chExt cx="2177143" cy="1171959"/>
+          </a:xfrm>
+        </p:grpSpPr>
+        <p:cxnSp>
+          <p:nvCxnSpPr>
+            <p:cNvPr id="62" name="Straight Arrow Connector 61">
+              <a:extLst>
+                <a:ext uri="{FF2B5EF4-FFF2-40B4-BE49-F238E27FC236}">
+                  <a16:creationId xmlns:a16="http://schemas.microsoft.com/office/drawing/2014/main" id="{6A540F0E-F663-49F7-BA61-A87BF1294976}"/>
+                </a:ext>
+              </a:extLst>
+            </p:cNvPr>
+            <p:cNvCxnSpPr/>
+            <p:nvPr/>
+          </p:nvCxnSpPr>
+          <p:spPr>
+            <a:xfrm flipV="1">
+              <a:off x="5943600" y="2465612"/>
+              <a:ext cx="2177143" cy="3"/>
+            </a:xfrm>
+            <a:prstGeom prst="straightConnector1">
+              <a:avLst/>
+            </a:prstGeom>
+            <a:ln w="254000">
+              <a:tailEnd type="triangle"/>
+            </a:ln>
+          </p:spPr>
+          <p:style>
+            <a:lnRef idx="1">
+              <a:schemeClr val="accent1"/>
+            </a:lnRef>
+            <a:fillRef idx="0">
+              <a:schemeClr val="accent1"/>
+            </a:fillRef>
+            <a:effectRef idx="0">
+              <a:schemeClr val="accent1"/>
+            </a:effectRef>
+            <a:fontRef idx="minor">
+              <a:schemeClr val="tx1"/>
+            </a:fontRef>
+          </p:style>
+        </p:cxnSp>
+        <mc:AlternateContent xmlns:mc="http://schemas.openxmlformats.org/markup-compatibility/2006">
+          <mc:Choice xmlns:a14="http://schemas.microsoft.com/office/drawing/2010/main" Requires="a14">
+            <p:sp>
+              <p:nvSpPr>
+                <p:cNvPr id="63" name="TextBox 62">
+                  <a:extLst>
+                    <a:ext uri="{FF2B5EF4-FFF2-40B4-BE49-F238E27FC236}">
+                      <a16:creationId xmlns:a16="http://schemas.microsoft.com/office/drawing/2014/main" id="{A6975A36-E1EA-4A62-A8B8-17DEE377C47D}"/>
+                    </a:ext>
+                  </a:extLst>
+                </p:cNvPr>
+                <p:cNvSpPr txBox="1"/>
+                <p:nvPr/>
+              </p:nvSpPr>
+              <p:spPr>
+                <a:xfrm>
+                  <a:off x="6276873" y="1293656"/>
+                  <a:ext cx="866968" cy="923330"/>
+                </a:xfrm>
+                <a:prstGeom prst="rect">
+                  <a:avLst/>
+                </a:prstGeom>
+                <a:noFill/>
+              </p:spPr>
+              <p:txBody>
+                <a:bodyPr wrap="none" rtlCol="0">
+                  <a:spAutoFit/>
+                </a:bodyPr>
+                <a:lstStyle/>
+                <a:p>
+                  <a14:m>
+                    <m:oMathPara xmlns:m="http://schemas.openxmlformats.org/officeDocument/2006/math">
+                      <m:oMathParaPr>
+                        <m:jc m:val="centerGroup"/>
+                      </m:oMathParaPr>
+                      <m:oMath xmlns:m="http://schemas.openxmlformats.org/officeDocument/2006/math">
+                        <m:r>
+                          <a:rPr lang="en-US" sz="5400" b="0" i="1" smtClean="0">
+                            <a:latin typeface="Cambria Math" panose="02040503050406030204" pitchFamily="18" charset="0"/>
+                          </a:rPr>
+                          <m:t>𝐻</m:t>
+                        </m:r>
+                      </m:oMath>
+                    </m:oMathPara>
+                  </a14:m>
+                  <a:endParaRPr lang="en-US" sz="5400" b="0" dirty="0"/>
+                </a:p>
+              </p:txBody>
+            </p:sp>
+          </mc:Choice>
+          <mc:Fallback>
+            <p:sp>
+              <p:nvSpPr>
+                <p:cNvPr id="63" name="TextBox 62">
+                  <a:extLst>
+                    <a:ext uri="{FF2B5EF4-FFF2-40B4-BE49-F238E27FC236}">
+                      <a16:creationId xmlns:a16="http://schemas.microsoft.com/office/drawing/2014/main" id="{A6975A36-E1EA-4A62-A8B8-17DEE377C47D}"/>
+                    </a:ext>
+                  </a:extLst>
+                </p:cNvPr>
+                <p:cNvSpPr txBox="1">
+                  <a:spLocks noRot="1" noChangeAspect="1" noMove="1" noResize="1" noEditPoints="1" noAdjustHandles="1" noChangeArrowheads="1" noChangeShapeType="1" noTextEdit="1"/>
+                </p:cNvSpPr>
+                <p:nvPr/>
+              </p:nvSpPr>
+              <p:spPr>
+                <a:xfrm>
+                  <a:off x="6276873" y="1293656"/>
+                  <a:ext cx="866968" cy="923330"/>
+                </a:xfrm>
+                <a:prstGeom prst="rect">
+                  <a:avLst/>
+                </a:prstGeom>
+                <a:blipFill>
+                  <a:blip r:embed="rId13"/>
+                  <a:stretch>
+                    <a:fillRect/>
+                  </a:stretch>
+                </a:blipFill>
+              </p:spPr>
+              <p:txBody>
+                <a:bodyPr/>
+                <a:lstStyle/>
+                <a:p>
+                  <a:r>
+                    <a:rPr lang="en-US">
+                      <a:noFill/>
+                    </a:rPr>
+                    <a:t> </a:t>
+                  </a:r>
+                </a:p>
+              </p:txBody>
+            </p:sp>
+          </mc:Fallback>
+        </mc:AlternateContent>
+      </p:grpSp>
     </p:spTree>
     <p:extLst>
       <p:ext uri="{BB962C8B-B14F-4D97-AF65-F5344CB8AC3E}">

</xml_diff>